<commit_message>
Added some updates to Presentation
Please delete any unnecessary information. Some slides need adjustments.
</commit_message>
<xml_diff>
--- a/Auraria Campus App.pptx
+++ b/Auraria Campus App.pptx
@@ -5,27 +5,30 @@
     <p:sldMasterId id="2147483648" r:id="rId2"/>
   </p:sldMasterIdLst>
   <p:notesMasterIdLst>
-    <p:notesMasterId r:id="rId13"/>
+    <p:notesMasterId r:id="rId16"/>
   </p:notesMasterIdLst>
   <p:handoutMasterIdLst>
-    <p:handoutMasterId r:id="rId14"/>
+    <p:handoutMasterId r:id="rId17"/>
   </p:handoutMasterIdLst>
   <p:sldIdLst>
     <p:sldId id="265" r:id="rId3"/>
     <p:sldId id="321" r:id="rId4"/>
-    <p:sldId id="320" r:id="rId5"/>
-    <p:sldId id="313" r:id="rId6"/>
-    <p:sldId id="312" r:id="rId7"/>
-    <p:sldId id="314" r:id="rId8"/>
-    <p:sldId id="315" r:id="rId9"/>
-    <p:sldId id="316" r:id="rId10"/>
-    <p:sldId id="318" r:id="rId11"/>
-    <p:sldId id="319" r:id="rId12"/>
+    <p:sldId id="322" r:id="rId5"/>
+    <p:sldId id="320" r:id="rId6"/>
+    <p:sldId id="313" r:id="rId7"/>
+    <p:sldId id="312" r:id="rId8"/>
+    <p:sldId id="324" r:id="rId9"/>
+    <p:sldId id="325" r:id="rId10"/>
+    <p:sldId id="326" r:id="rId11"/>
+    <p:sldId id="327" r:id="rId12"/>
+    <p:sldId id="328" r:id="rId13"/>
+    <p:sldId id="329" r:id="rId14"/>
+    <p:sldId id="323" r:id="rId15"/>
   </p:sldIdLst>
   <p:sldSz cx="12188825" cy="6858000"/>
   <p:notesSz cx="6858000" cy="9144000"/>
   <p:custDataLst>
-    <p:tags r:id="rId15"/>
+    <p:tags r:id="rId18"/>
   </p:custDataLst>
   <p:defaultTextStyle>
     <a:defPPr>
@@ -124,7 +127,7 @@
   </p:defaultTextStyle>
   <p:extLst>
     <p:ext uri="{EFAFB233-063F-42B5-8137-9DF3F51BA10A}">
-      <p15:sldGuideLst xmlns:p15="http://schemas.microsoft.com/office/powerpoint/2012/main">
+      <p15:sldGuideLst xmlns="" xmlns:p15="http://schemas.microsoft.com/office/powerpoint/2012/main">
         <p15:guide id="1" pos="3839" userDrawn="1">
           <p15:clr>
             <a:srgbClr val="A4A3A4"/>
@@ -138,7 +141,7 @@
       </p15:sldGuideLst>
     </p:ext>
     <p:ext uri="{2D200454-40CA-4A62-9FC3-DE9A4176ACB9}">
-      <p15:notesGuideLst xmlns:p15="http://schemas.microsoft.com/office/powerpoint/2012/main"/>
+      <p15:notesGuideLst xmlns="" xmlns:p15="http://schemas.microsoft.com/office/powerpoint/2012/main"/>
     </p:ext>
   </p:extLst>
 </p:presentation>
@@ -1604,12 +1607,12 @@
     <dgm:cxn modelId="{AA4CC157-9C0B-4720-882A-7688D4A5358E}" type="presOf" srcId="{2B461DC0-F901-4B60-8803-434DF9D8676F}" destId="{E83793B4-2C5C-4D90-82FA-E5EE4745664D}" srcOrd="0" destOrd="1" presId="urn:microsoft.com/office/officeart/2005/8/layout/hProcess4"/>
     <dgm:cxn modelId="{BDEC2C5D-C48A-4E63-B705-84CAA8C90885}" srcId="{58828492-5CEF-4AFE-95CB-5D7E6A18158B}" destId="{4873D279-FECD-4519-8CC0-20765D0926A7}" srcOrd="1" destOrd="0" parTransId="{30B30AD7-AB45-4CF6-AA00-6240BEB25FFB}" sibTransId="{43B38218-1B91-418C-85AC-B64FC8DAB5A3}"/>
     <dgm:cxn modelId="{4143D757-8617-4C89-8322-E3B29A1874AF}" srcId="{58828492-5CEF-4AFE-95CB-5D7E6A18158B}" destId="{68838C34-4D02-49F8-ADD7-BFA90D87B7EA}" srcOrd="0" destOrd="0" parTransId="{F2AD00AD-6A23-4C89-A107-68EF5D1F0B94}" sibTransId="{FFC4FCE7-6F2F-4F91-A74A-7C4C32A81657}"/>
+    <dgm:cxn modelId="{EB6C31E4-1B27-4568-9BE5-392C2B5FA135}" type="presOf" srcId="{EA10196F-1A7C-459C-B980-62DAFF1D8567}" destId="{BFE859F2-A9E8-4F95-9161-8EC68F2D30C4}" srcOrd="1" destOrd="1" presId="urn:microsoft.com/office/officeart/2005/8/layout/hProcess4"/>
     <dgm:cxn modelId="{0C99A0E7-7B5A-462A-BC31-41CB3B1D1005}" type="presOf" srcId="{0E9DE493-19D7-4EC9-97C9-5F26233F1106}" destId="{3960CFF8-4383-4382-8D6D-F2A00F508E8D}" srcOrd="0" destOrd="0" presId="urn:microsoft.com/office/officeart/2005/8/layout/hProcess4"/>
-    <dgm:cxn modelId="{EB6C31E4-1B27-4568-9BE5-392C2B5FA135}" type="presOf" srcId="{EA10196F-1A7C-459C-B980-62DAFF1D8567}" destId="{BFE859F2-A9E8-4F95-9161-8EC68F2D30C4}" srcOrd="1" destOrd="1" presId="urn:microsoft.com/office/officeart/2005/8/layout/hProcess4"/>
     <dgm:cxn modelId="{300E722A-937B-4681-BF9C-7933B3C6956A}" type="presOf" srcId="{F6D27D1B-CDCB-481F-B8FA-AB31B2A119DE}" destId="{029D1FDE-4DD7-4FA5-8C70-0C747477B66C}" srcOrd="0" destOrd="0" presId="urn:microsoft.com/office/officeart/2005/8/layout/hProcess4"/>
     <dgm:cxn modelId="{0DE04CA7-8D0A-42E1-B07A-0D64581626CA}" type="presOf" srcId="{7AEB6639-3258-49E8-8B1F-B4A9C61922BE}" destId="{DC2A0ADB-DCE3-4BF4-9952-0394865777AC}" srcOrd="0" destOrd="0" presId="urn:microsoft.com/office/officeart/2005/8/layout/hProcess4"/>
+    <dgm:cxn modelId="{0360AFD8-99F2-49BD-94EB-823D0A8E9D84}" type="presOf" srcId="{EA10196F-1A7C-459C-B980-62DAFF1D8567}" destId="{96015622-8A46-45CF-A72A-2856B699B374}" srcOrd="0" destOrd="1" presId="urn:microsoft.com/office/officeart/2005/8/layout/hProcess4"/>
     <dgm:cxn modelId="{878AE697-35FC-403D-92A3-0B92F7B7EB7A}" type="presOf" srcId="{0B00F5A8-A0EF-4111-9D86-004317B4F49E}" destId="{E83793B4-2C5C-4D90-82FA-E5EE4745664D}" srcOrd="0" destOrd="0" presId="urn:microsoft.com/office/officeart/2005/8/layout/hProcess4"/>
-    <dgm:cxn modelId="{0360AFD8-99F2-49BD-94EB-823D0A8E9D84}" type="presOf" srcId="{EA10196F-1A7C-459C-B980-62DAFF1D8567}" destId="{96015622-8A46-45CF-A72A-2856B699B374}" srcOrd="0" destOrd="1" presId="urn:microsoft.com/office/officeart/2005/8/layout/hProcess4"/>
     <dgm:cxn modelId="{E9730C94-0A42-4F8E-B45A-02CE25449719}" type="presOf" srcId="{AB2E8498-CC81-452F-A895-08F3845AA347}" destId="{BFE859F2-A9E8-4F95-9161-8EC68F2D30C4}" srcOrd="1" destOrd="0" presId="urn:microsoft.com/office/officeart/2005/8/layout/hProcess4"/>
     <dgm:cxn modelId="{3CE24A9C-391F-4487-8C6C-7B08CCFBA458}" srcId="{FB986F71-3126-4196-BD30-74AEDC39A1CA}" destId="{EA10196F-1A7C-459C-B980-62DAFF1D8567}" srcOrd="1" destOrd="0" parTransId="{22BF804E-5939-465E-9370-EAC9A51CE5E9}" sibTransId="{20A4DCBC-3103-49EB-9D9A-3070BCD930B1}"/>
     <dgm:cxn modelId="{0731A115-58A3-481B-8A1D-4C0F1D56F785}" type="presOf" srcId="{FB986F71-3126-4196-BD30-74AEDC39A1CA}" destId="{E18C6CF4-EDEB-4539-A36D-E0355B626199}" srcOrd="0" destOrd="0" presId="urn:microsoft.com/office/officeart/2005/8/layout/hProcess4"/>
@@ -2087,7 +2090,7 @@
             <a:gs pos="0">
               <a:schemeClr val="accent1">
                 <a:shade val="90000"/>
-                <a:hueOff val="361868"/>
+                <a:hueOff val="361866"/>
                 <a:satOff val="12502"/>
                 <a:lumOff val="24506"/>
                 <a:alphaOff val="0"/>
@@ -2099,7 +2102,7 @@
             <a:gs pos="50000">
               <a:schemeClr val="accent1">
                 <a:shade val="90000"/>
-                <a:hueOff val="361868"/>
+                <a:hueOff val="361866"/>
                 <a:satOff val="12502"/>
                 <a:lumOff val="24506"/>
                 <a:alphaOff val="0"/>
@@ -2111,7 +2114,7 @@
             <a:gs pos="100000">
               <a:schemeClr val="accent1">
                 <a:shade val="90000"/>
-                <a:hueOff val="361868"/>
+                <a:hueOff val="361866"/>
                 <a:satOff val="12502"/>
                 <a:lumOff val="24506"/>
                 <a:alphaOff val="0"/>
@@ -4133,7 +4136,7 @@
           <a:p>
             <a:fld id="{59088EAF-6ECA-4616-85EF-35AA19C641F3}" type="datetimeFigureOut">
               <a:rPr lang="en-US"/>
-              <a:t>5/4/2013</a:t>
+              <a:t>5/8/2013</a:t>
             </a:fld>
             <a:endParaRPr/>
           </a:p>
@@ -4298,7 +4301,7 @@
           <a:p>
             <a:fld id="{3ABD2D7A-D230-4F91-BD59-0A39C2703BA8}" type="datetimeFigureOut">
               <a:rPr lang="en-US"/>
-              <a:t>5/4/2013</a:t>
+              <a:t>5/8/2013</a:t>
             </a:fld>
             <a:endParaRPr/>
           </a:p>
@@ -4900,7 +4903,7 @@
           <a:p>
             <a:fld id="{03F41C87-7AD9-4845-A077-840E4A0F3F06}" type="datetimeFigureOut">
               <a:rPr lang="en-US"/>
-              <a:t>5/4/2013</a:t>
+              <a:t>5/8/2013</a:t>
             </a:fld>
             <a:endParaRPr/>
           </a:p>
@@ -5099,7 +5102,7 @@
           <a:p>
             <a:fld id="{03F41C87-7AD9-4845-A077-840E4A0F3F06}" type="datetimeFigureOut">
               <a:rPr lang="en-US"/>
-              <a:t>5/4/2013</a:t>
+              <a:t>5/8/2013</a:t>
             </a:fld>
             <a:endParaRPr/>
           </a:p>
@@ -5295,7 +5298,7 @@
           <a:p>
             <a:fld id="{03F41C87-7AD9-4845-A077-840E4A0F3F06}" type="datetimeFigureOut">
               <a:rPr lang="en-US"/>
-              <a:t>5/4/2013</a:t>
+              <a:t>5/8/2013</a:t>
             </a:fld>
             <a:endParaRPr/>
           </a:p>
@@ -5582,7 +5585,7 @@
           <a:p>
             <a:fld id="{03F41C87-7AD9-4845-A077-840E4A0F3F06}" type="datetimeFigureOut">
               <a:rPr lang="en-US"/>
-              <a:t>5/4/2013</a:t>
+              <a:t>5/8/2013</a:t>
             </a:fld>
             <a:endParaRPr/>
           </a:p>
@@ -5893,7 +5896,7 @@
           <a:p>
             <a:fld id="{03F41C87-7AD9-4845-A077-840E4A0F3F06}" type="datetimeFigureOut">
               <a:rPr lang="en-US"/>
-              <a:t>5/4/2013</a:t>
+              <a:t>5/8/2013</a:t>
             </a:fld>
             <a:endParaRPr/>
           </a:p>
@@ -6356,7 +6359,7 @@
           <a:p>
             <a:fld id="{03F41C87-7AD9-4845-A077-840E4A0F3F06}" type="datetimeFigureOut">
               <a:rPr lang="en-US"/>
-              <a:t>5/4/2013</a:t>
+              <a:t>5/8/2013</a:t>
             </a:fld>
             <a:endParaRPr/>
           </a:p>
@@ -6493,7 +6496,7 @@
           <a:p>
             <a:fld id="{03F41C87-7AD9-4845-A077-840E4A0F3F06}" type="datetimeFigureOut">
               <a:rPr lang="en-US"/>
-              <a:t>5/4/2013</a:t>
+              <a:t>5/8/2013</a:t>
             </a:fld>
             <a:endParaRPr/>
           </a:p>
@@ -6615,7 +6618,7 @@
           <a:p>
             <a:fld id="{03F41C87-7AD9-4845-A077-840E4A0F3F06}" type="datetimeFigureOut">
               <a:rPr lang="en-US"/>
-              <a:t>5/4/2013</a:t>
+              <a:t>5/8/2013</a:t>
             </a:fld>
             <a:endParaRPr/>
           </a:p>
@@ -6944,7 +6947,7 @@
           <a:p>
             <a:fld id="{03F41C87-7AD9-4845-A077-840E4A0F3F06}" type="datetimeFigureOut">
               <a:rPr lang="en-US"/>
-              <a:t>5/4/2013</a:t>
+              <a:t>5/8/2013</a:t>
             </a:fld>
             <a:endParaRPr/>
           </a:p>
@@ -7263,7 +7266,7 @@
             <a:fld id="{03F41C87-7AD9-4845-A077-840E4A0F3F06}" type="datetimeFigureOut">
               <a:rPr lang="en-US"/>
               <a:pPr/>
-              <a:t>5/4/2013</a:t>
+              <a:t>5/8/2013</a:t>
             </a:fld>
             <a:endParaRPr/>
           </a:p>
@@ -7506,7 +7509,7 @@
             <a:fld id="{03F41C87-7AD9-4845-A077-840E4A0F3F06}" type="datetimeFigureOut">
               <a:rPr lang="en-US"/>
               <a:pPr/>
-              <a:t>5/4/2013</a:t>
+              <a:t>5/8/2013</a:t>
             </a:fld>
             <a:endParaRPr/>
           </a:p>
@@ -7933,7 +7936,7 @@
   </p:txStyles>
   <p:extLst>
     <p:ext uri="{27BBF7A9-308A-43DC-89C8-2F10F3537804}">
-      <p15:sldGuideLst xmlns:p15="http://schemas.microsoft.com/office/powerpoint/2012/main">
+      <p15:sldGuideLst xmlns="" xmlns:p15="http://schemas.microsoft.com/office/powerpoint/2012/main">
         <p15:guide id="1" pos="3839" userDrawn="1">
           <p15:clr>
             <a:srgbClr val="F26B43"/>
@@ -7983,12 +7986,8 @@
           <a:lstStyle/>
           <a:p>
             <a:r>
-              <a:rPr lang="en-US" dirty="0" err="1" smtClean="0"/>
-              <a:t>Auraria</a:t>
-            </a:r>
-            <a:r>
               <a:rPr lang="en-US" dirty="0" smtClean="0"/>
-              <a:t> Campus App</a:t>
+              <a:t>Auraria Campus App</a:t>
             </a:r>
             <a:endParaRPr lang="en-US" dirty="0"/>
           </a:p>
@@ -8017,6 +8016,51 @@
           </a:p>
         </p:txBody>
       </p:sp>
+      <p:pic>
+        <p:nvPicPr>
+          <p:cNvPr id="1027" name="Picture 3" descr="C:\Users\Chubby\Documents\SP 2013\CIS-4160\Group Project\Images\ApplicationTileImage.png"/>
+          <p:cNvPicPr>
+            <a:picLocks noChangeAspect="1" noChangeArrowheads="1"/>
+          </p:cNvPicPr>
+          <p:nvPr/>
+        </p:nvPicPr>
+        <p:blipFill>
+          <a:blip r:embed="rId2">
+            <a:extLst>
+              <a:ext uri="{28A0092B-C50C-407E-A947-70E740481C1C}">
+                <a14:useLocalDpi xmlns:a14="http://schemas.microsoft.com/office/drawing/2010/main" val="0"/>
+              </a:ext>
+            </a:extLst>
+          </a:blip>
+          <a:srcRect/>
+          <a:stretch>
+            <a:fillRect/>
+          </a:stretch>
+        </p:blipFill>
+        <p:spPr bwMode="auto">
+          <a:xfrm>
+            <a:off x="531812" y="457200"/>
+            <a:ext cx="2438400" cy="2438400"/>
+          </a:xfrm>
+          <a:prstGeom prst="rect">
+            <a:avLst/>
+          </a:prstGeom>
+          <a:noFill/>
+          <a:effectLst>
+            <a:reflection blurRad="6350" stA="52000" endA="300" endPos="35000" dir="5400000" sy="-100000" algn="bl" rotWithShape="0"/>
+            <a:softEdge rad="63500"/>
+          </a:effectLst>
+          <a:extLst>
+            <a:ext uri="{909E8E84-426E-40DD-AFC4-6F175D3DCCD1}">
+              <a14:hiddenFill xmlns:a14="http://schemas.microsoft.com/office/drawing/2010/main">
+                <a:solidFill>
+                  <a:srgbClr val="FFFFFF"/>
+                </a:solidFill>
+              </a14:hiddenFill>
+            </a:ext>
+          </a:extLst>
+        </p:spPr>
+      </p:pic>
     </p:spTree>
     <p:extLst>
       <p:ext uri="{BB962C8B-B14F-4D97-AF65-F5344CB8AC3E}">
@@ -8068,19 +8112,7 @@
       </p:grpSpPr>
       <p:sp>
         <p:nvSpPr>
-          <p:cNvPr id="2" name="Picture Placeholder 1"/>
-          <p:cNvSpPr>
-            <a:spLocks noGrp="1"/>
-          </p:cNvSpPr>
-          <p:nvPr>
-            <p:ph type="pic" idx="1"/>
-          </p:nvPr>
-        </p:nvSpPr>
-        <p:spPr/>
-      </p:sp>
-      <p:sp>
-        <p:nvSpPr>
-          <p:cNvPr id="3" name="Title 2"/>
+          <p:cNvPr id="2" name="Title 1"/>
           <p:cNvSpPr>
             <a:spLocks noGrp="1"/>
           </p:cNvSpPr>
@@ -8093,18 +8125,22 @@
           <a:bodyPr/>
           <a:lstStyle/>
           <a:p>
-            <a:endParaRPr lang="en-US"/>
+            <a:r>
+              <a:rPr lang="en-US" dirty="0" smtClean="0"/>
+              <a:t>Prototyping: Schema and Data Modeling</a:t>
+            </a:r>
+            <a:endParaRPr lang="en-US" dirty="0"/>
           </a:p>
         </p:txBody>
       </p:sp>
       <p:sp>
         <p:nvSpPr>
-          <p:cNvPr id="4" name="Text Placeholder 3"/>
+          <p:cNvPr id="3" name="Content Placeholder 2"/>
           <p:cNvSpPr>
             <a:spLocks noGrp="1"/>
           </p:cNvSpPr>
           <p:nvPr>
-            <p:ph type="body" sz="half" idx="2"/>
+            <p:ph idx="1"/>
           </p:nvPr>
         </p:nvSpPr>
         <p:spPr/>
@@ -8112,14 +8148,405 @@
           <a:bodyPr/>
           <a:lstStyle/>
           <a:p>
-            <a:endParaRPr lang="en-US"/>
+            <a:endParaRPr lang="en-US" dirty="0"/>
           </a:p>
         </p:txBody>
       </p:sp>
     </p:spTree>
     <p:extLst>
       <p:ext uri="{BB962C8B-B14F-4D97-AF65-F5344CB8AC3E}">
-        <p14:creationId xmlns:p14="http://schemas.microsoft.com/office/powerpoint/2010/main" val="1108506989"/>
+        <p14:creationId xmlns:p14="http://schemas.microsoft.com/office/powerpoint/2010/main" val="713873792"/>
+      </p:ext>
+    </p:extLst>
+  </p:cSld>
+  <p:clrMapOvr>
+    <a:masterClrMapping/>
+  </p:clrMapOvr>
+  <mc:AlternateContent xmlns:mc="http://schemas.openxmlformats.org/markup-compatibility/2006" xmlns:p14="http://schemas.microsoft.com/office/powerpoint/2010/main">
+    <mc:Choice Requires="p14">
+      <p:transition spd="med" p14:dur="700">
+        <p:fade/>
+      </p:transition>
+    </mc:Choice>
+    <mc:Fallback xmlns="">
+      <p:transition spd="med">
+        <p:fade/>
+      </p:transition>
+    </mc:Fallback>
+  </mc:AlternateContent>
+</p:sld>
+</file>
+
+<file path=ppt/slides/slide11.xml><?xml version="1.0" encoding="utf-8"?>
+<p:sld xmlns:a="http://schemas.openxmlformats.org/drawingml/2006/main" xmlns:r="http://schemas.openxmlformats.org/officeDocument/2006/relationships" xmlns:p="http://schemas.openxmlformats.org/presentationml/2006/main">
+  <p:cSld>
+    <p:spTree>
+      <p:nvGrpSpPr>
+        <p:cNvPr id="1" name=""/>
+        <p:cNvGrpSpPr/>
+        <p:nvPr/>
+      </p:nvGrpSpPr>
+      <p:grpSpPr>
+        <a:xfrm>
+          <a:off x="0" y="0"/>
+          <a:ext cx="0" cy="0"/>
+          <a:chOff x="0" y="0"/>
+          <a:chExt cx="0" cy="0"/>
+        </a:xfrm>
+      </p:grpSpPr>
+      <p:sp>
+        <p:nvSpPr>
+          <p:cNvPr id="2" name="Title 1"/>
+          <p:cNvSpPr>
+            <a:spLocks noGrp="1"/>
+          </p:cNvSpPr>
+          <p:nvPr>
+            <p:ph type="title"/>
+          </p:nvPr>
+        </p:nvSpPr>
+        <p:spPr/>
+        <p:txBody>
+          <a:bodyPr/>
+          <a:lstStyle/>
+          <a:p>
+            <a:r>
+              <a:rPr lang="en-US" dirty="0" smtClean="0"/>
+              <a:t>Implement: Coding with Visual Studio</a:t>
+            </a:r>
+            <a:br>
+              <a:rPr lang="en-US" dirty="0" smtClean="0"/>
+            </a:br>
+            <a:r>
+              <a:rPr lang="en-US" dirty="0" smtClean="0"/>
+              <a:t>Windows Phone SDK 7.1</a:t>
+            </a:r>
+            <a:endParaRPr lang="en-US" dirty="0"/>
+          </a:p>
+        </p:txBody>
+      </p:sp>
+      <p:sp>
+        <p:nvSpPr>
+          <p:cNvPr id="3" name="Content Placeholder 2"/>
+          <p:cNvSpPr>
+            <a:spLocks noGrp="1"/>
+          </p:cNvSpPr>
+          <p:nvPr>
+            <p:ph idx="1"/>
+          </p:nvPr>
+        </p:nvSpPr>
+        <p:spPr/>
+        <p:txBody>
+          <a:bodyPr/>
+          <a:lstStyle/>
+          <a:p>
+            <a:r>
+              <a:rPr lang="en-US" dirty="0" smtClean="0"/>
+              <a:t>Easily accessible platform</a:t>
+            </a:r>
+          </a:p>
+          <a:p>
+            <a:endParaRPr lang="en-US" dirty="0"/>
+          </a:p>
+        </p:txBody>
+      </p:sp>
+    </p:spTree>
+    <p:extLst>
+      <p:ext uri="{BB962C8B-B14F-4D97-AF65-F5344CB8AC3E}">
+        <p14:creationId xmlns:p14="http://schemas.microsoft.com/office/powerpoint/2010/main" val="161079877"/>
+      </p:ext>
+    </p:extLst>
+  </p:cSld>
+  <p:clrMapOvr>
+    <a:masterClrMapping/>
+  </p:clrMapOvr>
+  <mc:AlternateContent xmlns:mc="http://schemas.openxmlformats.org/markup-compatibility/2006" xmlns:p14="http://schemas.microsoft.com/office/powerpoint/2010/main">
+    <mc:Choice Requires="p14">
+      <p:transition spd="med" p14:dur="700">
+        <p:fade/>
+      </p:transition>
+    </mc:Choice>
+    <mc:Fallback xmlns="">
+      <p:transition spd="med">
+        <p:fade/>
+      </p:transition>
+    </mc:Fallback>
+  </mc:AlternateContent>
+</p:sld>
+</file>
+
+<file path=ppt/slides/slide12.xml><?xml version="1.0" encoding="utf-8"?>
+<p:sld xmlns:a="http://schemas.openxmlformats.org/drawingml/2006/main" xmlns:r="http://schemas.openxmlformats.org/officeDocument/2006/relationships" xmlns:p="http://schemas.openxmlformats.org/presentationml/2006/main">
+  <p:cSld>
+    <p:spTree>
+      <p:nvGrpSpPr>
+        <p:cNvPr id="1" name=""/>
+        <p:cNvGrpSpPr/>
+        <p:nvPr/>
+      </p:nvGrpSpPr>
+      <p:grpSpPr>
+        <a:xfrm>
+          <a:off x="0" y="0"/>
+          <a:ext cx="0" cy="0"/>
+          <a:chOff x="0" y="0"/>
+          <a:chExt cx="0" cy="0"/>
+        </a:xfrm>
+      </p:grpSpPr>
+      <p:sp>
+        <p:nvSpPr>
+          <p:cNvPr id="2" name="Title 1"/>
+          <p:cNvSpPr>
+            <a:spLocks noGrp="1"/>
+          </p:cNvSpPr>
+          <p:nvPr>
+            <p:ph type="title"/>
+          </p:nvPr>
+        </p:nvSpPr>
+        <p:spPr/>
+        <p:txBody>
+          <a:bodyPr/>
+          <a:lstStyle/>
+          <a:p>
+            <a:r>
+              <a:rPr lang="en-US" dirty="0" smtClean="0"/>
+              <a:t>Implement: Version Control</a:t>
+            </a:r>
+            <a:endParaRPr lang="en-US" dirty="0"/>
+          </a:p>
+        </p:txBody>
+      </p:sp>
+      <p:sp>
+        <p:nvSpPr>
+          <p:cNvPr id="3" name="Content Placeholder 2"/>
+          <p:cNvSpPr>
+            <a:spLocks noGrp="1"/>
+          </p:cNvSpPr>
+          <p:nvPr>
+            <p:ph idx="1"/>
+          </p:nvPr>
+        </p:nvSpPr>
+        <p:spPr/>
+        <p:txBody>
+          <a:bodyPr/>
+          <a:lstStyle/>
+          <a:p>
+            <a:r>
+              <a:rPr lang="en-US" dirty="0" smtClean="0"/>
+              <a:t>Current beta version: 0.9</a:t>
+            </a:r>
+          </a:p>
+          <a:p>
+            <a:r>
+              <a:rPr lang="en-US" dirty="0" smtClean="0"/>
+              <a:t>Full version: 1.0</a:t>
+            </a:r>
+          </a:p>
+          <a:p>
+            <a:r>
+              <a:rPr lang="en-US" dirty="0" smtClean="0"/>
+              <a:t>Implement the Upgrade and Update version</a:t>
+            </a:r>
+          </a:p>
+          <a:p>
+            <a:pPr lvl="1"/>
+            <a:r>
+              <a:rPr lang="en-US" dirty="0" smtClean="0"/>
+              <a:t>1 being upgrade version – for major App’s changes and enhancements</a:t>
+            </a:r>
+          </a:p>
+          <a:p>
+            <a:pPr lvl="1"/>
+            <a:r>
+              <a:rPr lang="en-US" dirty="0" smtClean="0"/>
+              <a:t>0 being update version – for minor App’s changes and information updates.</a:t>
+            </a:r>
+          </a:p>
+          <a:p>
+            <a:endParaRPr lang="en-US" dirty="0"/>
+          </a:p>
+        </p:txBody>
+      </p:sp>
+    </p:spTree>
+    <p:extLst>
+      <p:ext uri="{BB962C8B-B14F-4D97-AF65-F5344CB8AC3E}">
+        <p14:creationId xmlns:p14="http://schemas.microsoft.com/office/powerpoint/2010/main" val="3946960534"/>
+      </p:ext>
+    </p:extLst>
+  </p:cSld>
+  <p:clrMapOvr>
+    <a:masterClrMapping/>
+  </p:clrMapOvr>
+  <mc:AlternateContent xmlns:mc="http://schemas.openxmlformats.org/markup-compatibility/2006" xmlns:p14="http://schemas.microsoft.com/office/powerpoint/2010/main">
+    <mc:Choice Requires="p14">
+      <p:transition spd="med" p14:dur="700">
+        <p:fade/>
+      </p:transition>
+    </mc:Choice>
+    <mc:Fallback xmlns="">
+      <p:transition spd="med">
+        <p:fade/>
+      </p:transition>
+    </mc:Fallback>
+  </mc:AlternateContent>
+</p:sld>
+</file>
+
+<file path=ppt/slides/slide13.xml><?xml version="1.0" encoding="utf-8"?>
+<p:sld xmlns:a="http://schemas.openxmlformats.org/drawingml/2006/main" xmlns:r="http://schemas.openxmlformats.org/officeDocument/2006/relationships" xmlns:p="http://schemas.openxmlformats.org/presentationml/2006/main">
+  <p:cSld>
+    <p:spTree>
+      <p:nvGrpSpPr>
+        <p:cNvPr id="1" name=""/>
+        <p:cNvGrpSpPr/>
+        <p:nvPr/>
+      </p:nvGrpSpPr>
+      <p:grpSpPr>
+        <a:xfrm>
+          <a:off x="0" y="0"/>
+          <a:ext cx="0" cy="0"/>
+          <a:chOff x="0" y="0"/>
+          <a:chExt cx="0" cy="0"/>
+        </a:xfrm>
+      </p:grpSpPr>
+      <p:sp>
+        <p:nvSpPr>
+          <p:cNvPr id="2" name="Title 1"/>
+          <p:cNvSpPr>
+            <a:spLocks noGrp="1"/>
+          </p:cNvSpPr>
+          <p:nvPr>
+            <p:ph type="title"/>
+          </p:nvPr>
+        </p:nvSpPr>
+        <p:spPr>
+          <a:xfrm>
+            <a:off x="1522412" y="228600"/>
+            <a:ext cx="9144001" cy="1066800"/>
+          </a:xfrm>
+        </p:spPr>
+        <p:txBody>
+          <a:bodyPr/>
+          <a:lstStyle/>
+          <a:p>
+            <a:r>
+              <a:rPr lang="en-US" dirty="0" smtClean="0"/>
+              <a:t>Future Upgrade and Features</a:t>
+            </a:r>
+            <a:endParaRPr lang="en-US" dirty="0"/>
+          </a:p>
+        </p:txBody>
+      </p:sp>
+      <p:sp>
+        <p:nvSpPr>
+          <p:cNvPr id="3" name="Content Placeholder 2"/>
+          <p:cNvSpPr>
+            <a:spLocks noGrp="1"/>
+          </p:cNvSpPr>
+          <p:nvPr>
+            <p:ph idx="1"/>
+          </p:nvPr>
+        </p:nvSpPr>
+        <p:spPr>
+          <a:xfrm>
+            <a:off x="1522413" y="1600201"/>
+            <a:ext cx="9905999" cy="4800600"/>
+          </a:xfrm>
+        </p:spPr>
+        <p:txBody>
+          <a:bodyPr>
+            <a:normAutofit fontScale="85000" lnSpcReduction="20000"/>
+          </a:bodyPr>
+          <a:lstStyle/>
+          <a:p>
+            <a:r>
+              <a:rPr lang="en-US" dirty="0" smtClean="0"/>
+              <a:t>Institution’ information on a scrollable screen</a:t>
+            </a:r>
+          </a:p>
+          <a:p>
+            <a:r>
+              <a:rPr lang="en-US" dirty="0" smtClean="0"/>
+              <a:t>Offline Campus map in the app as an image or PDF</a:t>
+            </a:r>
+          </a:p>
+          <a:p>
+            <a:pPr lvl="1"/>
+            <a:r>
+              <a:rPr lang="en-US" dirty="0" smtClean="0"/>
+              <a:t>With the location embedded on each buildings</a:t>
+            </a:r>
+          </a:p>
+          <a:p>
+            <a:pPr lvl="1"/>
+            <a:r>
+              <a:rPr lang="en-US" dirty="0" smtClean="0"/>
+              <a:t>User can tap on a building, and the App will direct user to Map app with the building’s pre-embedded map location and the user’s current location.</a:t>
+            </a:r>
+          </a:p>
+          <a:p>
+            <a:pPr lvl="1"/>
+            <a:r>
+              <a:rPr lang="en-US" dirty="0" smtClean="0"/>
+              <a:t>Without the Internet access (when Wi-Fi or cellular service turned off), the map will still be available offline for user to use; just without the location tracking.</a:t>
+            </a:r>
+          </a:p>
+          <a:p>
+            <a:r>
+              <a:rPr lang="en-US" dirty="0" smtClean="0"/>
+              <a:t>Help and About Page</a:t>
+            </a:r>
+          </a:p>
+          <a:p>
+            <a:pPr lvl="1"/>
+            <a:r>
+              <a:rPr lang="en-US" dirty="0" smtClean="0"/>
+              <a:t>Provide manual of the App</a:t>
+            </a:r>
+          </a:p>
+          <a:p>
+            <a:pPr lvl="1"/>
+            <a:r>
+              <a:rPr lang="en-US" dirty="0" smtClean="0"/>
+              <a:t>Provide contact information and credits to App’s developers.</a:t>
+            </a:r>
+          </a:p>
+          <a:p>
+            <a:r>
+              <a:rPr lang="en-US" dirty="0" smtClean="0"/>
+              <a:t>Platform expansion</a:t>
+            </a:r>
+          </a:p>
+          <a:p>
+            <a:pPr lvl="1"/>
+            <a:r>
+              <a:rPr lang="en-US" dirty="0" err="1" smtClean="0"/>
+              <a:t>iOS</a:t>
+            </a:r>
+            <a:r>
+              <a:rPr lang="en-US" dirty="0" smtClean="0"/>
+              <a:t> Native App</a:t>
+            </a:r>
+          </a:p>
+          <a:p>
+            <a:pPr lvl="1"/>
+            <a:r>
+              <a:rPr lang="en-US" dirty="0" smtClean="0"/>
+              <a:t>Android Native App</a:t>
+            </a:r>
+          </a:p>
+          <a:p>
+            <a:pPr lvl="1"/>
+            <a:r>
+              <a:rPr lang="en-US" dirty="0" smtClean="0"/>
+              <a:t>Web-based App</a:t>
+            </a:r>
+            <a:endParaRPr lang="en-US" dirty="0"/>
+          </a:p>
+        </p:txBody>
+      </p:sp>
+    </p:spTree>
+    <p:extLst>
+      <p:ext uri="{BB962C8B-B14F-4D97-AF65-F5344CB8AC3E}">
+        <p14:creationId xmlns:p14="http://schemas.microsoft.com/office/powerpoint/2010/main" val="3813756210"/>
       </p:ext>
     </p:extLst>
   </p:cSld>
@@ -8209,12 +8636,8 @@
               <a:rPr lang="en-US" dirty="0"/>
             </a:br>
             <a:r>
-              <a:rPr lang="en-US" dirty="0" err="1"/>
-              <a:t>Auraria</a:t>
-            </a:r>
-            <a:r>
               <a:rPr lang="en-US" dirty="0"/>
-              <a:t> Campus Application</a:t>
+              <a:t>Auraria Campus Application</a:t>
             </a:r>
           </a:p>
           <a:p>
@@ -8235,23 +8658,31 @@
             <a:pPr lvl="1"/>
             <a:r>
               <a:rPr lang="en-US" dirty="0"/>
-              <a:t>The goal is to bring information about the </a:t>
-            </a:r>
-            <a:r>
-              <a:rPr lang="en-US" dirty="0" err="1"/>
-              <a:t>auraria</a:t>
+              <a:t>The goal is to bring information about the A</a:t>
+            </a:r>
+            <a:r>
+              <a:rPr lang="en-US" dirty="0" smtClean="0"/>
+              <a:t>uraria </a:t>
             </a:r>
             <a:r>
               <a:rPr lang="en-US" dirty="0"/>
-              <a:t> campus to windows phone users in a more </a:t>
-            </a:r>
-            <a:r>
-              <a:rPr lang="en-US" dirty="0" err="1"/>
-              <a:t>convienent</a:t>
+              <a:t>campus to </a:t>
+            </a:r>
+            <a:r>
+              <a:rPr lang="en-US" dirty="0" smtClean="0"/>
+              <a:t>Windows </a:t>
             </a:r>
             <a:r>
               <a:rPr lang="en-US" dirty="0"/>
-              <a:t> native application</a:t>
+              <a:t>phone users in a more </a:t>
+            </a:r>
+            <a:r>
+              <a:rPr lang="en-US" dirty="0" smtClean="0"/>
+              <a:t>convenient </a:t>
+            </a:r>
+            <a:r>
+              <a:rPr lang="en-US" dirty="0"/>
+              <a:t>native application</a:t>
             </a:r>
             <a:r>
               <a:rPr lang="en-US" dirty="0" smtClean="0"/>
@@ -8312,6 +8743,154 @@
       </p:grpSpPr>
       <p:sp>
         <p:nvSpPr>
+          <p:cNvPr id="2" name="Title 1"/>
+          <p:cNvSpPr>
+            <a:spLocks noGrp="1"/>
+          </p:cNvSpPr>
+          <p:nvPr>
+            <p:ph type="title"/>
+          </p:nvPr>
+        </p:nvSpPr>
+        <p:spPr/>
+        <p:txBody>
+          <a:bodyPr/>
+          <a:lstStyle/>
+          <a:p>
+            <a:r>
+              <a:rPr lang="en-US" dirty="0" smtClean="0"/>
+              <a:t>Problem Statement and Proposed Solution</a:t>
+            </a:r>
+            <a:endParaRPr lang="en-US" dirty="0"/>
+          </a:p>
+        </p:txBody>
+      </p:sp>
+      <p:sp>
+        <p:nvSpPr>
+          <p:cNvPr id="3" name="Content Placeholder 2"/>
+          <p:cNvSpPr>
+            <a:spLocks noGrp="1"/>
+          </p:cNvSpPr>
+          <p:nvPr>
+            <p:ph idx="1"/>
+          </p:nvPr>
+        </p:nvSpPr>
+        <p:spPr/>
+        <p:txBody>
+          <a:bodyPr>
+            <a:normAutofit lnSpcReduction="10000"/>
+          </a:bodyPr>
+          <a:lstStyle/>
+          <a:p>
+            <a:r>
+              <a:rPr lang="en-US" sz="2200" dirty="0"/>
+              <a:t>Auraria Campus is a big and diverse campus serving three institutions:</a:t>
+            </a:r>
+          </a:p>
+          <a:p>
+            <a:pPr lvl="1"/>
+            <a:r>
+              <a:rPr lang="en-US" dirty="0"/>
+              <a:t>Community College of Denver (CCD)</a:t>
+            </a:r>
+          </a:p>
+          <a:p>
+            <a:pPr lvl="1"/>
+            <a:r>
+              <a:rPr lang="en-US" dirty="0"/>
+              <a:t>Metropolitan State University of Denver (MSU Denver)</a:t>
+            </a:r>
+          </a:p>
+          <a:p>
+            <a:pPr lvl="1"/>
+            <a:r>
+              <a:rPr lang="en-US" dirty="0"/>
+              <a:t>University of Colorado at Denver (CU Denver)</a:t>
+            </a:r>
+          </a:p>
+          <a:p>
+            <a:r>
+              <a:rPr lang="en-US" dirty="0" smtClean="0"/>
+              <a:t>Offices</a:t>
+            </a:r>
+            <a:r>
+              <a:rPr lang="en-US" dirty="0"/>
+              <a:t> </a:t>
+            </a:r>
+            <a:r>
+              <a:rPr lang="en-US" dirty="0" smtClean="0"/>
+              <a:t>and classes are spread-out over the campus, and it is hard to find for new students</a:t>
+            </a:r>
+            <a:r>
+              <a:rPr lang="en-US" dirty="0" smtClean="0"/>
+              <a:t>.</a:t>
+            </a:r>
+          </a:p>
+          <a:p>
+            <a:r>
+              <a:rPr lang="en-US" dirty="0" smtClean="0"/>
+              <a:t>Institutions’ information can be hard to find on the Web.</a:t>
+            </a:r>
+            <a:endParaRPr lang="en-US" dirty="0" smtClean="0"/>
+          </a:p>
+          <a:p>
+            <a:r>
+              <a:rPr lang="en-US" dirty="0" smtClean="0"/>
+              <a:t>Smart phones are everywhere with Internet access 24/7.</a:t>
+            </a:r>
+          </a:p>
+          <a:p>
+            <a:r>
+              <a:rPr lang="en-US" dirty="0" smtClean="0"/>
+              <a:t>So this App is an ideal app for the Auraria Campus.</a:t>
+            </a:r>
+            <a:endParaRPr lang="en-US" dirty="0"/>
+          </a:p>
+        </p:txBody>
+      </p:sp>
+    </p:spTree>
+    <p:extLst>
+      <p:ext uri="{BB962C8B-B14F-4D97-AF65-F5344CB8AC3E}">
+        <p14:creationId xmlns:p14="http://schemas.microsoft.com/office/powerpoint/2010/main" val="1153022733"/>
+      </p:ext>
+    </p:extLst>
+  </p:cSld>
+  <p:clrMapOvr>
+    <a:masterClrMapping/>
+  </p:clrMapOvr>
+  <mc:AlternateContent xmlns:mc="http://schemas.openxmlformats.org/markup-compatibility/2006" xmlns:p14="http://schemas.microsoft.com/office/powerpoint/2010/main">
+    <mc:Choice Requires="p14">
+      <p:transition spd="med" p14:dur="700">
+        <p:fade/>
+      </p:transition>
+    </mc:Choice>
+    <mc:Fallback xmlns="">
+      <p:transition spd="med">
+        <p:fade/>
+      </p:transition>
+    </mc:Fallback>
+  </mc:AlternateContent>
+</p:sld>
+</file>
+
+<file path=ppt/slides/slide4.xml><?xml version="1.0" encoding="utf-8"?>
+<p:sld xmlns:a="http://schemas.openxmlformats.org/drawingml/2006/main" xmlns:r="http://schemas.openxmlformats.org/officeDocument/2006/relationships" xmlns:p="http://schemas.openxmlformats.org/presentationml/2006/main">
+  <p:cSld>
+    <p:spTree>
+      <p:nvGrpSpPr>
+        <p:cNvPr id="1" name=""/>
+        <p:cNvGrpSpPr/>
+        <p:nvPr/>
+      </p:nvGrpSpPr>
+      <p:grpSpPr>
+        <a:xfrm>
+          <a:off x="0" y="0"/>
+          <a:ext cx="0" cy="0"/>
+          <a:chOff x="0" y="0"/>
+          <a:chExt cx="0" cy="0"/>
+        </a:xfrm>
+      </p:grpSpPr>
+      <p:sp>
+        <p:nvSpPr>
           <p:cNvPr id="13" name="Title 12"/>
           <p:cNvSpPr>
             <a:spLocks noGrp="1"/>
@@ -8345,38 +8924,83 @@
         </p:nvSpPr>
         <p:spPr/>
         <p:txBody>
-          <a:bodyPr/>
+          <a:bodyPr>
+            <a:normAutofit/>
+          </a:bodyPr>
           <a:lstStyle/>
           <a:p>
+            <a:r>
+              <a:rPr lang="en-US" dirty="0" smtClean="0"/>
+              <a:t>Auraria Campus App features:</a:t>
+            </a:r>
+          </a:p>
+          <a:p>
             <a:pPr lvl="1"/>
+            <a:r>
+              <a:rPr lang="en-US" dirty="0" smtClean="0"/>
+              <a:t>Campus’s and institutions</a:t>
+            </a:r>
+            <a:r>
+              <a:rPr lang="en-US" dirty="0" smtClean="0"/>
+              <a:t>’ important </a:t>
+            </a:r>
+            <a:r>
+              <a:rPr lang="en-US" dirty="0" smtClean="0"/>
+              <a:t>information</a:t>
+            </a:r>
+          </a:p>
+          <a:p>
+            <a:pPr lvl="1"/>
+            <a:r>
+              <a:rPr lang="en-US" dirty="0" smtClean="0"/>
+              <a:t>Campus Map in PDF</a:t>
+            </a:r>
+          </a:p>
+          <a:p>
+            <a:pPr lvl="1"/>
+            <a:r>
+              <a:rPr lang="en-US" dirty="0" smtClean="0"/>
+              <a:t>Campus Map based </a:t>
+            </a:r>
+            <a:r>
+              <a:rPr lang="en-US" dirty="0" smtClean="0"/>
+              <a:t>on GPS  location and user selection.</a:t>
+            </a:r>
+            <a:endParaRPr lang="en-US" dirty="0" smtClean="0"/>
+          </a:p>
+          <a:p>
             <a:r>
               <a:rPr lang="en-US" dirty="0" smtClean="0"/>
               <a:t>What </a:t>
             </a:r>
             <a:r>
               <a:rPr lang="en-US" dirty="0"/>
-              <a:t>features where completed? </a:t>
-            </a:r>
-            <a:br>
+              <a:t>features where completed</a:t>
+            </a:r>
+            <a:r>
+              <a:rPr lang="en-US" dirty="0" smtClean="0"/>
+              <a:t>?</a:t>
+            </a:r>
+          </a:p>
+          <a:p>
+            <a:pPr lvl="1"/>
+            <a:r>
+              <a:rPr lang="en-US" dirty="0" smtClean="0"/>
+              <a:t>Direct links to the institutions’ Website</a:t>
+            </a:r>
+          </a:p>
+          <a:p>
+            <a:pPr lvl="1"/>
+            <a:r>
+              <a:rPr lang="en-US" dirty="0" smtClean="0"/>
+              <a:t>Location-based Map redirection via Google Map and/or Map App</a:t>
+            </a:r>
+          </a:p>
+          <a:p>
+            <a:pPr lvl="1"/>
+            <a:r>
               <a:rPr lang="en-US" dirty="0"/>
-            </a:br>
-            <a:r>
-              <a:rPr lang="en-US" dirty="0"/>
-              <a:t>What still needs to be done?</a:t>
-            </a:r>
-            <a:br>
-              <a:rPr lang="en-US" dirty="0"/>
-            </a:br>
-            <a:r>
-              <a:rPr lang="en-US" dirty="0"/>
-              <a:t>Did the development suggest any new ideas?</a:t>
-            </a:r>
-            <a:br>
-              <a:rPr lang="en-US" dirty="0"/>
-            </a:br>
-            <a:r>
-              <a:rPr lang="en-US" dirty="0"/>
-              <a:t>Are these new ideas in the project?</a:t>
+              <a:t/>
             </a:r>
             <a:br>
               <a:rPr lang="en-US" dirty="0"/>
@@ -8417,7 +9041,7 @@
 </p:sld>
 </file>
 
-<file path=ppt/slides/slide4.xml><?xml version="1.0" encoding="utf-8"?>
+<file path=ppt/slides/slide5.xml><?xml version="1.0" encoding="utf-8"?>
 <p:sld xmlns:a="http://schemas.openxmlformats.org/drawingml/2006/main" xmlns:r="http://schemas.openxmlformats.org/officeDocument/2006/relationships" xmlns:p="http://schemas.openxmlformats.org/presentationml/2006/main">
   <p:cSld>
     <p:spTree>
@@ -8668,7 +9292,7 @@
 </p:sld>
 </file>
 
-<file path=ppt/slides/slide5.xml><?xml version="1.0" encoding="utf-8"?>
+<file path=ppt/slides/slide6.xml><?xml version="1.0" encoding="utf-8"?>
 <p:sld xmlns:a="http://schemas.openxmlformats.org/drawingml/2006/main" xmlns:r="http://schemas.openxmlformats.org/officeDocument/2006/relationships" xmlns:p="http://schemas.openxmlformats.org/presentationml/2006/main">
   <p:cSld>
     <p:spTree>
@@ -8765,86 +9389,6 @@
 </p:sld>
 </file>
 
-<file path=ppt/slides/slide6.xml><?xml version="1.0" encoding="utf-8"?>
-<p:sld xmlns:a="http://schemas.openxmlformats.org/drawingml/2006/main" xmlns:r="http://schemas.openxmlformats.org/officeDocument/2006/relationships" xmlns:p="http://schemas.openxmlformats.org/presentationml/2006/main">
-  <p:cSld>
-    <p:spTree>
-      <p:nvGrpSpPr>
-        <p:cNvPr id="1" name=""/>
-        <p:cNvGrpSpPr/>
-        <p:nvPr/>
-      </p:nvGrpSpPr>
-      <p:grpSpPr>
-        <a:xfrm>
-          <a:off x="0" y="0"/>
-          <a:ext cx="0" cy="0"/>
-          <a:chOff x="0" y="0"/>
-          <a:chExt cx="0" cy="0"/>
-        </a:xfrm>
-      </p:grpSpPr>
-      <p:sp>
-        <p:nvSpPr>
-          <p:cNvPr id="2" name="Title 1"/>
-          <p:cNvSpPr>
-            <a:spLocks noGrp="1"/>
-          </p:cNvSpPr>
-          <p:nvPr>
-            <p:ph type="title"/>
-          </p:nvPr>
-        </p:nvSpPr>
-        <p:spPr/>
-        <p:txBody>
-          <a:bodyPr/>
-          <a:lstStyle/>
-          <a:p>
-            <a:endParaRPr lang="en-US"/>
-          </a:p>
-        </p:txBody>
-      </p:sp>
-      <p:sp>
-        <p:nvSpPr>
-          <p:cNvPr id="3" name="Text Placeholder 2"/>
-          <p:cNvSpPr>
-            <a:spLocks noGrp="1"/>
-          </p:cNvSpPr>
-          <p:nvPr>
-            <p:ph type="body" idx="1"/>
-          </p:nvPr>
-        </p:nvSpPr>
-        <p:spPr/>
-        <p:txBody>
-          <a:bodyPr/>
-          <a:lstStyle/>
-          <a:p>
-            <a:endParaRPr lang="en-US"/>
-          </a:p>
-        </p:txBody>
-      </p:sp>
-    </p:spTree>
-    <p:extLst>
-      <p:ext uri="{BB962C8B-B14F-4D97-AF65-F5344CB8AC3E}">
-        <p14:creationId xmlns:p14="http://schemas.microsoft.com/office/powerpoint/2010/main" val="2478160142"/>
-      </p:ext>
-    </p:extLst>
-  </p:cSld>
-  <p:clrMapOvr>
-    <a:masterClrMapping/>
-  </p:clrMapOvr>
-  <mc:AlternateContent xmlns:mc="http://schemas.openxmlformats.org/markup-compatibility/2006" xmlns:p14="http://schemas.microsoft.com/office/powerpoint/2010/main">
-    <mc:Choice Requires="p14">
-      <p:transition spd="med" p14:dur="700">
-        <p:fade/>
-      </p:transition>
-    </mc:Choice>
-    <mc:Fallback xmlns="">
-      <p:transition spd="med">
-        <p:fade/>
-      </p:transition>
-    </mc:Fallback>
-  </mc:AlternateContent>
-</p:sld>
-</file>
-
 <file path=ppt/slides/slide7.xml><?xml version="1.0" encoding="utf-8"?>
 <p:sld xmlns:a="http://schemas.openxmlformats.org/drawingml/2006/main" xmlns:r="http://schemas.openxmlformats.org/officeDocument/2006/relationships" xmlns:p="http://schemas.openxmlformats.org/presentationml/2006/main">
   <p:cSld>
@@ -8877,18 +9421,22 @@
           <a:bodyPr/>
           <a:lstStyle/>
           <a:p>
-            <a:endParaRPr lang="en-US"/>
+            <a:r>
+              <a:rPr lang="en-US" dirty="0" smtClean="0"/>
+              <a:t>Planning: Business Requirement</a:t>
+            </a:r>
+            <a:endParaRPr lang="en-US" dirty="0"/>
           </a:p>
         </p:txBody>
       </p:sp>
       <p:sp>
         <p:nvSpPr>
-          <p:cNvPr id="3" name="Text Placeholder 2"/>
+          <p:cNvPr id="3" name="Content Placeholder 2"/>
           <p:cNvSpPr>
             <a:spLocks noGrp="1"/>
           </p:cNvSpPr>
           <p:nvPr>
-            <p:ph type="body" idx="1"/>
+            <p:ph idx="1"/>
           </p:nvPr>
         </p:nvSpPr>
         <p:spPr/>
@@ -8896,71 +9444,41 @@
           <a:bodyPr/>
           <a:lstStyle/>
           <a:p>
-            <a:endParaRPr lang="en-US"/>
-          </a:p>
-        </p:txBody>
-      </p:sp>
-      <p:sp>
-        <p:nvSpPr>
-          <p:cNvPr id="4" name="Content Placeholder 3"/>
-          <p:cNvSpPr>
-            <a:spLocks noGrp="1"/>
-          </p:cNvSpPr>
-          <p:nvPr>
-            <p:ph sz="half" idx="2"/>
-          </p:nvPr>
-        </p:nvSpPr>
-        <p:spPr/>
-        <p:txBody>
-          <a:bodyPr/>
-          <a:lstStyle/>
-          <a:p>
-            <a:endParaRPr lang="en-US"/>
-          </a:p>
-        </p:txBody>
-      </p:sp>
-      <p:sp>
-        <p:nvSpPr>
-          <p:cNvPr id="5" name="Text Placeholder 4"/>
-          <p:cNvSpPr>
-            <a:spLocks noGrp="1"/>
-          </p:cNvSpPr>
-          <p:nvPr>
-            <p:ph type="body" sz="quarter" idx="3"/>
-          </p:nvPr>
-        </p:nvSpPr>
-        <p:spPr/>
-        <p:txBody>
-          <a:bodyPr/>
-          <a:lstStyle/>
-          <a:p>
-            <a:endParaRPr lang="en-US"/>
-          </a:p>
-        </p:txBody>
-      </p:sp>
-      <p:sp>
-        <p:nvSpPr>
-          <p:cNvPr id="6" name="Content Placeholder 5"/>
-          <p:cNvSpPr>
-            <a:spLocks noGrp="1"/>
-          </p:cNvSpPr>
-          <p:nvPr>
-            <p:ph sz="quarter" idx="4"/>
-          </p:nvPr>
-        </p:nvSpPr>
-        <p:spPr/>
-        <p:txBody>
-          <a:bodyPr/>
-          <a:lstStyle/>
-          <a:p>
-            <a:endParaRPr lang="en-US"/>
+            <a:r>
+              <a:rPr lang="en-US" dirty="0" smtClean="0"/>
+              <a:t>Objective</a:t>
+            </a:r>
+          </a:p>
+          <a:p>
+            <a:pPr lvl="1"/>
+            <a:r>
+              <a:rPr lang="en-US" dirty="0" smtClean="0"/>
+              <a:t>To create a convenient mobile App for Auraria community</a:t>
+            </a:r>
+          </a:p>
+          <a:p>
+            <a:pPr lvl="1"/>
+            <a:r>
+              <a:rPr lang="en-US" dirty="0" smtClean="0"/>
+              <a:t>To help students, faculty, and staff to easily and quickly find important information of campus</a:t>
+            </a:r>
+          </a:p>
+          <a:p>
+            <a:pPr lvl="1"/>
+            <a:r>
+              <a:rPr lang="en-US" dirty="0" smtClean="0"/>
+              <a:t>To be able to use smartphone’s GPS for direction.</a:t>
+            </a:r>
+          </a:p>
+          <a:p>
+            <a:endParaRPr lang="en-US" dirty="0"/>
           </a:p>
         </p:txBody>
       </p:sp>
     </p:spTree>
     <p:extLst>
       <p:ext uri="{BB962C8B-B14F-4D97-AF65-F5344CB8AC3E}">
-        <p14:creationId xmlns:p14="http://schemas.microsoft.com/office/powerpoint/2010/main" val="2681425051"/>
+        <p14:creationId xmlns:p14="http://schemas.microsoft.com/office/powerpoint/2010/main" val="2779090416"/>
       </p:ext>
     </p:extLst>
   </p:cSld>
@@ -9014,14 +9532,71 @@
           <a:bodyPr/>
           <a:lstStyle/>
           <a:p>
-            <a:endParaRPr lang="en-US"/>
+            <a:r>
+              <a:rPr lang="en-US" dirty="0" smtClean="0"/>
+              <a:t>Planning: Functional Requirement</a:t>
+            </a:r>
+            <a:endParaRPr lang="en-US" dirty="0"/>
+          </a:p>
+        </p:txBody>
+      </p:sp>
+      <p:sp>
+        <p:nvSpPr>
+          <p:cNvPr id="3" name="Content Placeholder 2"/>
+          <p:cNvSpPr>
+            <a:spLocks noGrp="1"/>
+          </p:cNvSpPr>
+          <p:nvPr>
+            <p:ph idx="1"/>
+          </p:nvPr>
+        </p:nvSpPr>
+        <p:spPr/>
+        <p:txBody>
+          <a:bodyPr/>
+          <a:lstStyle/>
+          <a:p>
+            <a:r>
+              <a:rPr lang="en-US" dirty="0" smtClean="0"/>
+              <a:t>Simple and easy-to-use App</a:t>
+            </a:r>
+          </a:p>
+          <a:p>
+            <a:r>
+              <a:rPr lang="en-US" dirty="0" smtClean="0"/>
+              <a:t>User can self-navigate through the app</a:t>
+            </a:r>
+          </a:p>
+          <a:p>
+            <a:r>
+              <a:rPr lang="en-US" dirty="0" smtClean="0"/>
+              <a:t>Important information of the campus provided on a native app</a:t>
+            </a:r>
+          </a:p>
+          <a:p>
+            <a:r>
+              <a:rPr lang="en-US" dirty="0" smtClean="0"/>
+              <a:t>With the phone offline (no Internet service), Campus information and Map are available</a:t>
+            </a:r>
+          </a:p>
+          <a:p>
+            <a:r>
+              <a:rPr lang="en-US" dirty="0" smtClean="0"/>
+              <a:t>With Internet access, user can locate the location of any buildings and direction to the place.</a:t>
+            </a:r>
+          </a:p>
+          <a:p>
+            <a:r>
+              <a:rPr lang="en-US" dirty="0" smtClean="0"/>
+              <a:t>Information updated regularly to reflect any changes.</a:t>
+            </a:r>
+            <a:endParaRPr lang="en-US" dirty="0"/>
           </a:p>
         </p:txBody>
       </p:sp>
     </p:spTree>
     <p:extLst>
       <p:ext uri="{BB962C8B-B14F-4D97-AF65-F5344CB8AC3E}">
-        <p14:creationId xmlns:p14="http://schemas.microsoft.com/office/powerpoint/2010/main" val="2590506655"/>
+        <p14:creationId xmlns:p14="http://schemas.microsoft.com/office/powerpoint/2010/main" val="835833068"/>
       </p:ext>
     </p:extLst>
   </p:cSld>
@@ -9075,7 +9650,11 @@
           <a:bodyPr/>
           <a:lstStyle/>
           <a:p>
-            <a:endParaRPr lang="en-US"/>
+            <a:r>
+              <a:rPr lang="en-US" dirty="0" smtClean="0"/>
+              <a:t>Prototyping: Wireframes</a:t>
+            </a:r>
+            <a:endParaRPr lang="en-US" dirty="0"/>
           </a:p>
         </p:txBody>
       </p:sp>
@@ -9094,33 +9673,18 @@
           <a:bodyPr/>
           <a:lstStyle/>
           <a:p>
-            <a:endParaRPr lang="en-US"/>
-          </a:p>
-        </p:txBody>
-      </p:sp>
-      <p:sp>
-        <p:nvSpPr>
-          <p:cNvPr id="4" name="Text Placeholder 3"/>
-          <p:cNvSpPr>
-            <a:spLocks noGrp="1"/>
-          </p:cNvSpPr>
-          <p:nvPr>
-            <p:ph type="body" sz="half" idx="2"/>
-          </p:nvPr>
-        </p:nvSpPr>
-        <p:spPr/>
-        <p:txBody>
-          <a:bodyPr/>
-          <a:lstStyle/>
-          <a:p>
-            <a:endParaRPr lang="en-US"/>
+            <a:r>
+              <a:rPr lang="en-US" dirty="0" smtClean="0"/>
+              <a:t>Demo the prototype</a:t>
+            </a:r>
+            <a:endParaRPr lang="en-US" dirty="0"/>
           </a:p>
         </p:txBody>
       </p:sp>
     </p:spTree>
     <p:extLst>
       <p:ext uri="{BB962C8B-B14F-4D97-AF65-F5344CB8AC3E}">
-        <p14:creationId xmlns:p14="http://schemas.microsoft.com/office/powerpoint/2010/main" val="2765137111"/>
+        <p14:creationId xmlns:p14="http://schemas.microsoft.com/office/powerpoint/2010/main" val="1252643766"/>
       </p:ext>
     </p:extLst>
   </p:cSld>

</xml_diff>

<commit_message>
Added Release .xap and edited/finalized Presentation
</commit_message>
<xml_diff>
--- a/Auraria Campus App.pptx
+++ b/Auraria Campus App.pptx
@@ -127,7 +127,7 @@
   </p:defaultTextStyle>
   <p:extLst>
     <p:ext uri="{EFAFB233-063F-42B5-8137-9DF3F51BA10A}">
-      <p15:sldGuideLst xmlns="" xmlns:p15="http://schemas.microsoft.com/office/powerpoint/2012/main">
+      <p15:sldGuideLst xmlns:p15="http://schemas.microsoft.com/office/powerpoint/2012/main">
         <p15:guide id="1" pos="3839" userDrawn="1">
           <p15:clr>
             <a:srgbClr val="A4A3A4"/>
@@ -141,7 +141,7 @@
       </p15:sldGuideLst>
     </p:ext>
     <p:ext uri="{2D200454-40CA-4A62-9FC3-DE9A4176ACB9}">
-      <p15:notesGuideLst xmlns="" xmlns:p15="http://schemas.microsoft.com/office/powerpoint/2012/main"/>
+      <p15:notesGuideLst xmlns:p15="http://schemas.microsoft.com/office/powerpoint/2012/main"/>
     </p:ext>
   </p:extLst>
 </p:presentation>
@@ -1198,7 +1198,11 @@
         <a:p>
           <a:r>
             <a:rPr lang="en-US" dirty="0" smtClean="0"/>
-            <a:t>Coding with VS Windows Phone SDK 7.1</a:t>
+            <a:t>VS Windows </a:t>
+          </a:r>
+          <a:r>
+            <a:rPr lang="en-US" dirty="0" smtClean="0"/>
+            <a:t>Phone SDK 7.1</a:t>
           </a:r>
           <a:endParaRPr lang="en-US" dirty="0"/>
         </a:p>
@@ -2090,7 +2094,7 @@
             <a:gs pos="0">
               <a:schemeClr val="accent1">
                 <a:shade val="90000"/>
-                <a:hueOff val="361866"/>
+                <a:hueOff val="361868"/>
                 <a:satOff val="12502"/>
                 <a:lumOff val="24506"/>
                 <a:alphaOff val="0"/>
@@ -2102,7 +2106,7 @@
             <a:gs pos="50000">
               <a:schemeClr val="accent1">
                 <a:shade val="90000"/>
-                <a:hueOff val="361866"/>
+                <a:hueOff val="361868"/>
                 <a:satOff val="12502"/>
                 <a:lumOff val="24506"/>
                 <a:alphaOff val="0"/>
@@ -2114,7 +2118,7 @@
             <a:gs pos="100000">
               <a:schemeClr val="accent1">
                 <a:shade val="90000"/>
-                <a:hueOff val="361866"/>
+                <a:hueOff val="361868"/>
                 <a:satOff val="12502"/>
                 <a:lumOff val="24506"/>
                 <a:alphaOff val="0"/>
@@ -2333,7 +2337,11 @@
           </a:pPr>
           <a:r>
             <a:rPr lang="en-US" sz="2400" kern="1200" dirty="0" smtClean="0"/>
-            <a:t>Coding with VS Windows Phone SDK 7.1</a:t>
+            <a:t>VS Windows </a:t>
+          </a:r>
+          <a:r>
+            <a:rPr lang="en-US" sz="2400" kern="1200" dirty="0" smtClean="0"/>
+            <a:t>Phone SDK 7.1</a:t>
           </a:r>
           <a:endParaRPr lang="en-US" sz="2400" kern="1200" dirty="0"/>
         </a:p>
@@ -4103,7 +4111,7 @@
             </a:lvl1pPr>
           </a:lstStyle>
           <a:p>
-            <a:endParaRPr/>
+            <a:endParaRPr dirty="0"/>
           </a:p>
         </p:txBody>
       </p:sp>
@@ -4136,9 +4144,9 @@
           <a:p>
             <a:fld id="{59088EAF-6ECA-4616-85EF-35AA19C641F3}" type="datetimeFigureOut">
               <a:rPr lang="en-US"/>
-              <a:t>5/8/2013</a:t>
+              <a:t>5/9/2013</a:t>
             </a:fld>
-            <a:endParaRPr/>
+            <a:endParaRPr dirty="0"/>
           </a:p>
         </p:txBody>
       </p:sp>
@@ -4169,7 +4177,7 @@
             </a:lvl1pPr>
           </a:lstStyle>
           <a:p>
-            <a:endParaRPr/>
+            <a:endParaRPr dirty="0"/>
           </a:p>
         </p:txBody>
       </p:sp>
@@ -4204,7 +4212,7 @@
               <a:rPr/>
               <a:t>‹#›</a:t>
             </a:fld>
-            <a:endParaRPr/>
+            <a:endParaRPr dirty="0"/>
           </a:p>
         </p:txBody>
       </p:sp>
@@ -4268,7 +4276,7 @@
             </a:lvl1pPr>
           </a:lstStyle>
           <a:p>
-            <a:endParaRPr/>
+            <a:endParaRPr dirty="0"/>
           </a:p>
         </p:txBody>
       </p:sp>
@@ -4301,9 +4309,9 @@
           <a:p>
             <a:fld id="{3ABD2D7A-D230-4F91-BD59-0A39C2703BA8}" type="datetimeFigureOut">
               <a:rPr lang="en-US"/>
-              <a:t>5/8/2013</a:t>
+              <a:t>5/9/2013</a:t>
             </a:fld>
-            <a:endParaRPr/>
+            <a:endParaRPr dirty="0"/>
           </a:p>
         </p:txBody>
       </p:sp>
@@ -4336,7 +4344,7 @@
           <a:bodyPr vert="horz" lIns="91440" tIns="45720" rIns="91440" bIns="45720" rtlCol="0" anchor="ctr"/>
           <a:lstStyle/>
           <a:p>
-            <a:endParaRPr/>
+            <a:endParaRPr dirty="0"/>
           </a:p>
         </p:txBody>
       </p:sp>
@@ -4426,7 +4434,7 @@
             </a:lvl1pPr>
           </a:lstStyle>
           <a:p>
-            <a:endParaRPr/>
+            <a:endParaRPr dirty="0"/>
           </a:p>
         </p:txBody>
       </p:sp>
@@ -4461,7 +4469,7 @@
               <a:rPr/>
               <a:t>‹#›</a:t>
             </a:fld>
-            <a:endParaRPr/>
+            <a:endParaRPr dirty="0"/>
           </a:p>
         </p:txBody>
       </p:sp>
@@ -4903,9 +4911,9 @@
           <a:p>
             <a:fld id="{03F41C87-7AD9-4845-A077-840E4A0F3F06}" type="datetimeFigureOut">
               <a:rPr lang="en-US"/>
-              <a:t>5/8/2013</a:t>
+              <a:t>5/9/2013</a:t>
             </a:fld>
-            <a:endParaRPr/>
+            <a:endParaRPr dirty="0"/>
           </a:p>
         </p:txBody>
       </p:sp>
@@ -4924,7 +4932,7 @@
           <a:bodyPr/>
           <a:lstStyle/>
           <a:p>
-            <a:endParaRPr/>
+            <a:endParaRPr dirty="0"/>
           </a:p>
         </p:txBody>
       </p:sp>
@@ -4947,7 +4955,7 @@
               <a:rPr/>
               <a:t>‹#›</a:t>
             </a:fld>
-            <a:endParaRPr/>
+            <a:endParaRPr dirty="0"/>
           </a:p>
         </p:txBody>
       </p:sp>
@@ -5102,9 +5110,9 @@
           <a:p>
             <a:fld id="{03F41C87-7AD9-4845-A077-840E4A0F3F06}" type="datetimeFigureOut">
               <a:rPr lang="en-US"/>
-              <a:t>5/8/2013</a:t>
+              <a:t>5/9/2013</a:t>
             </a:fld>
-            <a:endParaRPr/>
+            <a:endParaRPr dirty="0"/>
           </a:p>
         </p:txBody>
       </p:sp>
@@ -5123,7 +5131,7 @@
           <a:bodyPr/>
           <a:lstStyle/>
           <a:p>
-            <a:endParaRPr/>
+            <a:endParaRPr dirty="0"/>
           </a:p>
         </p:txBody>
       </p:sp>
@@ -5146,7 +5154,7 @@
               <a:rPr/>
               <a:t>‹#›</a:t>
             </a:fld>
-            <a:endParaRPr/>
+            <a:endParaRPr dirty="0"/>
           </a:p>
         </p:txBody>
       </p:sp>
@@ -5298,9 +5306,9 @@
           <a:p>
             <a:fld id="{03F41C87-7AD9-4845-A077-840E4A0F3F06}" type="datetimeFigureOut">
               <a:rPr lang="en-US"/>
-              <a:t>5/8/2013</a:t>
+              <a:t>5/9/2013</a:t>
             </a:fld>
-            <a:endParaRPr/>
+            <a:endParaRPr dirty="0"/>
           </a:p>
         </p:txBody>
       </p:sp>
@@ -5319,7 +5327,7 @@
           <a:bodyPr/>
           <a:lstStyle/>
           <a:p>
-            <a:endParaRPr/>
+            <a:endParaRPr dirty="0"/>
           </a:p>
         </p:txBody>
       </p:sp>
@@ -5342,7 +5350,7 @@
               <a:rPr/>
               <a:t>‹#›</a:t>
             </a:fld>
-            <a:endParaRPr/>
+            <a:endParaRPr dirty="0"/>
           </a:p>
         </p:txBody>
       </p:sp>
@@ -5585,9 +5593,9 @@
           <a:p>
             <a:fld id="{03F41C87-7AD9-4845-A077-840E4A0F3F06}" type="datetimeFigureOut">
               <a:rPr lang="en-US"/>
-              <a:t>5/8/2013</a:t>
+              <a:t>5/9/2013</a:t>
             </a:fld>
-            <a:endParaRPr/>
+            <a:endParaRPr dirty="0"/>
           </a:p>
         </p:txBody>
       </p:sp>
@@ -5606,7 +5614,7 @@
           <a:bodyPr/>
           <a:lstStyle/>
           <a:p>
-            <a:endParaRPr/>
+            <a:endParaRPr dirty="0"/>
           </a:p>
         </p:txBody>
       </p:sp>
@@ -5629,7 +5637,7 @@
               <a:rPr/>
               <a:t>‹#›</a:t>
             </a:fld>
-            <a:endParaRPr/>
+            <a:endParaRPr dirty="0"/>
           </a:p>
         </p:txBody>
       </p:sp>
@@ -5896,9 +5904,9 @@
           <a:p>
             <a:fld id="{03F41C87-7AD9-4845-A077-840E4A0F3F06}" type="datetimeFigureOut">
               <a:rPr lang="en-US"/>
-              <a:t>5/8/2013</a:t>
+              <a:t>5/9/2013</a:t>
             </a:fld>
-            <a:endParaRPr/>
+            <a:endParaRPr dirty="0"/>
           </a:p>
         </p:txBody>
       </p:sp>
@@ -5917,7 +5925,7 @@
           <a:bodyPr/>
           <a:lstStyle/>
           <a:p>
-            <a:endParaRPr/>
+            <a:endParaRPr dirty="0"/>
           </a:p>
         </p:txBody>
       </p:sp>
@@ -5940,7 +5948,7 @@
               <a:rPr/>
               <a:t>‹#›</a:t>
             </a:fld>
-            <a:endParaRPr/>
+            <a:endParaRPr dirty="0"/>
           </a:p>
         </p:txBody>
       </p:sp>
@@ -6359,9 +6367,9 @@
           <a:p>
             <a:fld id="{03F41C87-7AD9-4845-A077-840E4A0F3F06}" type="datetimeFigureOut">
               <a:rPr lang="en-US"/>
-              <a:t>5/8/2013</a:t>
+              <a:t>5/9/2013</a:t>
             </a:fld>
-            <a:endParaRPr/>
+            <a:endParaRPr dirty="0"/>
           </a:p>
         </p:txBody>
       </p:sp>
@@ -6380,7 +6388,7 @@
           <a:bodyPr/>
           <a:lstStyle/>
           <a:p>
-            <a:endParaRPr/>
+            <a:endParaRPr dirty="0"/>
           </a:p>
         </p:txBody>
       </p:sp>
@@ -6403,7 +6411,7 @@
               <a:rPr/>
               <a:t>‹#›</a:t>
             </a:fld>
-            <a:endParaRPr/>
+            <a:endParaRPr dirty="0"/>
           </a:p>
         </p:txBody>
       </p:sp>
@@ -6496,9 +6504,9 @@
           <a:p>
             <a:fld id="{03F41C87-7AD9-4845-A077-840E4A0F3F06}" type="datetimeFigureOut">
               <a:rPr lang="en-US"/>
-              <a:t>5/8/2013</a:t>
+              <a:t>5/9/2013</a:t>
             </a:fld>
-            <a:endParaRPr/>
+            <a:endParaRPr dirty="0"/>
           </a:p>
         </p:txBody>
       </p:sp>
@@ -6517,7 +6525,7 @@
           <a:bodyPr/>
           <a:lstStyle/>
           <a:p>
-            <a:endParaRPr/>
+            <a:endParaRPr dirty="0"/>
           </a:p>
         </p:txBody>
       </p:sp>
@@ -6540,7 +6548,7 @@
               <a:rPr/>
               <a:t>‹#›</a:t>
             </a:fld>
-            <a:endParaRPr/>
+            <a:endParaRPr dirty="0"/>
           </a:p>
         </p:txBody>
       </p:sp>
@@ -6618,9 +6626,9 @@
           <a:p>
             <a:fld id="{03F41C87-7AD9-4845-A077-840E4A0F3F06}" type="datetimeFigureOut">
               <a:rPr lang="en-US"/>
-              <a:t>5/8/2013</a:t>
+              <a:t>5/9/2013</a:t>
             </a:fld>
-            <a:endParaRPr/>
+            <a:endParaRPr dirty="0"/>
           </a:p>
         </p:txBody>
       </p:sp>
@@ -6639,7 +6647,7 @@
           <a:bodyPr/>
           <a:lstStyle/>
           <a:p>
-            <a:endParaRPr/>
+            <a:endParaRPr dirty="0"/>
           </a:p>
         </p:txBody>
       </p:sp>
@@ -6662,7 +6670,7 @@
               <a:rPr/>
               <a:t>‹#›</a:t>
             </a:fld>
-            <a:endParaRPr/>
+            <a:endParaRPr dirty="0"/>
           </a:p>
         </p:txBody>
       </p:sp>
@@ -6947,9 +6955,9 @@
           <a:p>
             <a:fld id="{03F41C87-7AD9-4845-A077-840E4A0F3F06}" type="datetimeFigureOut">
               <a:rPr lang="en-US"/>
-              <a:t>5/8/2013</a:t>
+              <a:t>5/9/2013</a:t>
             </a:fld>
-            <a:endParaRPr/>
+            <a:endParaRPr dirty="0"/>
           </a:p>
         </p:txBody>
       </p:sp>
@@ -6968,7 +6976,7 @@
           <a:bodyPr/>
           <a:lstStyle/>
           <a:p>
-            <a:endParaRPr/>
+            <a:endParaRPr dirty="0"/>
           </a:p>
         </p:txBody>
       </p:sp>
@@ -6991,7 +6999,7 @@
               <a:rPr/>
               <a:t>‹#›</a:t>
             </a:fld>
-            <a:endParaRPr/>
+            <a:endParaRPr dirty="0"/>
           </a:p>
         </p:txBody>
       </p:sp>
@@ -7127,10 +7135,10 @@
           </a:lstStyle>
           <a:p>
             <a:r>
-              <a:rPr lang="en-US" smtClean="0"/>
+              <a:rPr lang="en-US" dirty="0" smtClean="0"/>
               <a:t>Click icon to add picture</a:t>
             </a:r>
-            <a:endParaRPr/>
+            <a:endParaRPr dirty="0"/>
           </a:p>
         </p:txBody>
       </p:sp>
@@ -7266,9 +7274,9 @@
             <a:fld id="{03F41C87-7AD9-4845-A077-840E4A0F3F06}" type="datetimeFigureOut">
               <a:rPr lang="en-US"/>
               <a:pPr/>
-              <a:t>5/8/2013</a:t>
+              <a:t>5/9/2013</a:t>
             </a:fld>
-            <a:endParaRPr/>
+            <a:endParaRPr dirty="0"/>
           </a:p>
         </p:txBody>
       </p:sp>
@@ -7287,7 +7295,7 @@
           <a:bodyPr/>
           <a:lstStyle/>
           <a:p>
-            <a:endParaRPr/>
+            <a:endParaRPr dirty="0"/>
           </a:p>
         </p:txBody>
       </p:sp>
@@ -7311,7 +7319,7 @@
               <a:pPr/>
               <a:t>‹#›</a:t>
             </a:fld>
-            <a:endParaRPr/>
+            <a:endParaRPr dirty="0"/>
           </a:p>
         </p:txBody>
       </p:sp>
@@ -7509,9 +7517,9 @@
             <a:fld id="{03F41C87-7AD9-4845-A077-840E4A0F3F06}" type="datetimeFigureOut">
               <a:rPr lang="en-US"/>
               <a:pPr/>
-              <a:t>5/8/2013</a:t>
+              <a:t>5/9/2013</a:t>
             </a:fld>
-            <a:endParaRPr/>
+            <a:endParaRPr dirty="0"/>
           </a:p>
         </p:txBody>
       </p:sp>
@@ -7548,7 +7556,7 @@
             </a:lvl1pPr>
           </a:lstStyle>
           <a:p>
-            <a:endParaRPr/>
+            <a:endParaRPr dirty="0"/>
           </a:p>
         </p:txBody>
       </p:sp>
@@ -7590,7 +7598,7 @@
               <a:pPr/>
               <a:t>‹#›</a:t>
             </a:fld>
-            <a:endParaRPr/>
+            <a:endParaRPr dirty="0"/>
           </a:p>
         </p:txBody>
       </p:sp>
@@ -7936,7 +7944,7 @@
   </p:txStyles>
   <p:extLst>
     <p:ext uri="{27BBF7A9-308A-43DC-89C8-2F10F3537804}">
-      <p15:sldGuideLst xmlns="" xmlns:p15="http://schemas.microsoft.com/office/powerpoint/2012/main">
+      <p15:sldGuideLst xmlns:p15="http://schemas.microsoft.com/office/powerpoint/2012/main">
         <p15:guide id="1" pos="3839" userDrawn="1">
           <p15:clr>
             <a:srgbClr val="F26B43"/>
@@ -8148,10 +8156,101 @@
           <a:bodyPr/>
           <a:lstStyle/>
           <a:p>
+            <a:r>
+              <a:rPr lang="en-US" dirty="0" smtClean="0"/>
+              <a:t>Minimalistic Application</a:t>
+            </a:r>
+          </a:p>
+          <a:p>
+            <a:r>
+              <a:rPr lang="en-US" dirty="0" smtClean="0"/>
+              <a:t>Most processing occurs in the Campus Map area</a:t>
+            </a:r>
+          </a:p>
+          <a:p>
+            <a:r>
+              <a:rPr lang="en-US" dirty="0" smtClean="0"/>
+              <a:t>PDF version of map is nearly 7MB</a:t>
+            </a:r>
+          </a:p>
+          <a:p>
+            <a:pPr lvl="1"/>
+            <a:r>
+              <a:rPr lang="en-US" dirty="0" smtClean="0"/>
+              <a:t>Can be taxing for limited data plans</a:t>
+            </a:r>
+          </a:p>
+          <a:p>
+            <a:r>
+              <a:rPr lang="en-US" dirty="0" smtClean="0"/>
+              <a:t>No back end database required</a:t>
+            </a:r>
             <a:endParaRPr lang="en-US" dirty="0"/>
           </a:p>
         </p:txBody>
       </p:sp>
+      <p:pic>
+        <p:nvPicPr>
+          <p:cNvPr id="4" name="Picture 3"/>
+          <p:cNvPicPr/>
+          <p:nvPr/>
+        </p:nvPicPr>
+        <p:blipFill rotWithShape="1">
+          <a:blip r:embed="rId2" cstate="email">
+            <a:extLst>
+              <a:ext uri="{28A0092B-C50C-407E-A947-70E740481C1C}">
+                <a14:useLocalDpi xmlns:a14="http://schemas.microsoft.com/office/drawing/2010/main"/>
+              </a:ext>
+            </a:extLst>
+          </a:blip>
+          <a:srcRect/>
+          <a:stretch/>
+        </p:blipFill>
+        <p:spPr bwMode="auto">
+          <a:xfrm>
+            <a:off x="6551612" y="3036715"/>
+            <a:ext cx="4877752" cy="2983085"/>
+          </a:xfrm>
+          <a:prstGeom prst="snip2DiagRect">
+            <a:avLst/>
+          </a:prstGeom>
+          <a:solidFill>
+            <a:srgbClr val="FFFFFF">
+              <a:shade val="85000"/>
+            </a:srgbClr>
+          </a:solidFill>
+          <a:ln w="88900" cap="sq">
+            <a:solidFill>
+              <a:srgbClr val="FFFFFF"/>
+            </a:solidFill>
+            <a:miter lim="800000"/>
+          </a:ln>
+          <a:effectLst>
+            <a:outerShdw blurRad="88900" algn="tl" rotWithShape="0">
+              <a:srgbClr val="000000">
+                <a:alpha val="45000"/>
+              </a:srgbClr>
+            </a:outerShdw>
+          </a:effectLst>
+          <a:scene3d>
+            <a:camera prst="orthographicFront"/>
+            <a:lightRig rig="twoPt" dir="t">
+              <a:rot lat="0" lon="0" rev="7200000"/>
+            </a:lightRig>
+          </a:scene3d>
+          <a:sp3d>
+            <a:bevelT w="25400" h="19050"/>
+            <a:contourClr>
+              <a:srgbClr val="FFFFFF"/>
+            </a:contourClr>
+          </a:sp3d>
+          <a:extLst>
+            <a:ext uri="{53640926-AAD7-44D8-BBD7-CCE9431645EC}">
+              <a14:shadowObscured xmlns:a14="http://schemas.microsoft.com/office/drawing/2010/main"/>
+            </a:ext>
+          </a:extLst>
+        </p:spPr>
+      </p:pic>
     </p:spTree>
     <p:extLst>
       <p:ext uri="{BB962C8B-B14F-4D97-AF65-F5344CB8AC3E}">
@@ -8241,8 +8340,31 @@
           <a:p>
             <a:r>
               <a:rPr lang="en-US" dirty="0" smtClean="0"/>
-              <a:t>Easily accessible platform</a:t>
-            </a:r>
+              <a:t>Visual Studio 2012 provides an excellent IDE to use with the Windows Phone SDK 7.1 or 8.0</a:t>
+            </a:r>
+          </a:p>
+          <a:p>
+            <a:r>
+              <a:rPr lang="en-US" dirty="0" smtClean="0"/>
+              <a:t>Code written in C#</a:t>
+            </a:r>
+          </a:p>
+          <a:p>
+            <a:r>
+              <a:rPr lang="en-US" dirty="0"/>
+              <a:t>Easily accessible </a:t>
+            </a:r>
+            <a:r>
+              <a:rPr lang="en-US" dirty="0" smtClean="0"/>
+              <a:t>platform</a:t>
+            </a:r>
+          </a:p>
+          <a:p>
+            <a:r>
+              <a:rPr lang="en-US" dirty="0" smtClean="0"/>
+              <a:t>Tested with Windows Phone Emulator</a:t>
+            </a:r>
+            <a:endParaRPr lang="en-US" dirty="0"/>
           </a:p>
           <a:p>
             <a:endParaRPr lang="en-US" dirty="0"/>
@@ -8357,8 +8479,26 @@
             <a:pPr lvl="1"/>
             <a:r>
               <a:rPr lang="en-US" dirty="0" smtClean="0"/>
-              <a:t>0 being update version – for minor App’s changes and information updates.</a:t>
-            </a:r>
+              <a:t>0 being update version – for minor App’s changes and information updates</a:t>
+            </a:r>
+            <a:r>
+              <a:rPr lang="en-US" dirty="0" smtClean="0"/>
+              <a:t>.</a:t>
+            </a:r>
+          </a:p>
+          <a:p>
+            <a:r>
+              <a:rPr lang="en-US" dirty="0" smtClean="0"/>
+              <a:t>Utilized GitHub for version control with multiple programmers</a:t>
+            </a:r>
+          </a:p>
+          <a:p>
+            <a:pPr lvl="1"/>
+            <a:r>
+              <a:rPr lang="en-US" dirty="0" smtClean="0"/>
+              <a:t>10+ commits were made so far to this project. (revisions)</a:t>
+            </a:r>
+            <a:endParaRPr lang="en-US" dirty="0" smtClean="0"/>
           </a:p>
           <a:p>
             <a:endParaRPr lang="en-US" dirty="0"/>
@@ -8518,12 +8658,8 @@
           <a:p>
             <a:pPr lvl="1"/>
             <a:r>
-              <a:rPr lang="en-US" dirty="0" err="1" smtClean="0"/>
-              <a:t>iOS</a:t>
-            </a:r>
-            <a:r>
               <a:rPr lang="en-US" dirty="0" smtClean="0"/>
-              <a:t> Native App</a:t>
+              <a:t>iOS Native App</a:t>
             </a:r>
           </a:p>
           <a:p>
@@ -8687,6 +8823,27 @@
             <a:r>
               <a:rPr lang="en-US" dirty="0" smtClean="0"/>
               <a:t>.</a:t>
+            </a:r>
+          </a:p>
+          <a:p>
+            <a:pPr lvl="1"/>
+            <a:r>
+              <a:rPr lang="en-US" dirty="0" smtClean="0"/>
+              <a:t>Development Team:</a:t>
+            </a:r>
+          </a:p>
+          <a:p>
+            <a:pPr lvl="2"/>
+            <a:r>
+              <a:rPr lang="en-US" dirty="0" smtClean="0"/>
+              <a:t>Sokserey Tao</a:t>
+            </a:r>
+          </a:p>
+          <a:p>
+            <a:pPr lvl="2"/>
+            <a:r>
+              <a:rPr lang="en-US" dirty="0" smtClean="0"/>
+              <a:t>Elijah Gartin</a:t>
             </a:r>
             <a:endParaRPr lang="en-US" dirty="0"/>
           </a:p>
@@ -8777,7 +8934,7 @@
         <p:spPr/>
         <p:txBody>
           <a:bodyPr>
-            <a:normAutofit lnSpcReduction="10000"/>
+            <a:normAutofit fontScale="92500" lnSpcReduction="10000"/>
           </a:bodyPr>
           <a:lstStyle/>
           <a:p>
@@ -8818,11 +8975,23 @@
             </a:r>
             <a:r>
               <a:rPr lang="en-US" dirty="0" smtClean="0"/>
-              <a:t>and classes are spread-out over the campus, and it is hard to find for new students</a:t>
+              <a:t>and classes are </a:t>
             </a:r>
             <a:r>
               <a:rPr lang="en-US" dirty="0" smtClean="0"/>
-              <a:t>.</a:t>
+              <a:t>spread out </a:t>
+            </a:r>
+            <a:r>
+              <a:rPr lang="en-US" dirty="0" smtClean="0"/>
+              <a:t>over the </a:t>
+            </a:r>
+            <a:r>
+              <a:rPr lang="en-US" dirty="0" smtClean="0"/>
+              <a:t>campus </a:t>
+            </a:r>
+            <a:r>
+              <a:rPr lang="en-US" dirty="0" smtClean="0"/>
+              <a:t>and it is hard to find for new students.</a:t>
             </a:r>
           </a:p>
           <a:p>
@@ -8830,7 +8999,6 @@
               <a:rPr lang="en-US" dirty="0" smtClean="0"/>
               <a:t>Institutions’ information can be hard to find on the Web.</a:t>
             </a:r>
-            <a:endParaRPr lang="en-US" dirty="0" smtClean="0"/>
           </a:p>
           <a:p>
             <a:r>
@@ -8841,7 +9009,23 @@
           <a:p>
             <a:r>
               <a:rPr lang="en-US" dirty="0" smtClean="0"/>
-              <a:t>So this App is an ideal app for the Auraria Campus.</a:t>
+              <a:t>Therefore, this app </a:t>
+            </a:r>
+            <a:r>
+              <a:rPr lang="en-US" dirty="0" smtClean="0"/>
+              <a:t>is an ideal app </a:t>
+            </a:r>
+            <a:r>
+              <a:rPr lang="en-US" dirty="0" smtClean="0"/>
+              <a:t>to assist students in finding information for </a:t>
+            </a:r>
+            <a:r>
+              <a:rPr lang="en-US" dirty="0" smtClean="0"/>
+              <a:t>the Auraria </a:t>
+            </a:r>
+            <a:r>
+              <a:rPr lang="en-US" dirty="0" smtClean="0"/>
+              <a:t>Campus and their respective institution.</a:t>
             </a:r>
             <a:endParaRPr lang="en-US" dirty="0"/>
           </a:p>
@@ -8938,15 +9122,11 @@
             <a:pPr lvl="1"/>
             <a:r>
               <a:rPr lang="en-US" dirty="0" smtClean="0"/>
-              <a:t>Campus’s and institutions</a:t>
+              <a:t>Campus </a:t>
             </a:r>
             <a:r>
               <a:rPr lang="en-US" dirty="0" smtClean="0"/>
-              <a:t>’ important </a:t>
-            </a:r>
-            <a:r>
-              <a:rPr lang="en-US" dirty="0" smtClean="0"/>
-              <a:t>information</a:t>
+              <a:t>and institutions’ important information</a:t>
             </a:r>
           </a:p>
           <a:p>
@@ -8960,13 +9140,8 @@
             <a:pPr lvl="1"/>
             <a:r>
               <a:rPr lang="en-US" dirty="0" smtClean="0"/>
-              <a:t>Campus Map based </a:t>
-            </a:r>
-            <a:r>
-              <a:rPr lang="en-US" dirty="0" smtClean="0"/>
-              <a:t>on GPS  location and user selection.</a:t>
-            </a:r>
-            <a:endParaRPr lang="en-US" dirty="0" smtClean="0"/>
+              <a:t>Campus Map based on GPS  location and user selection.</a:t>
+            </a:r>
           </a:p>
           <a:p>
             <a:r>
@@ -8993,11 +9168,12 @@
             <a:pPr lvl="1"/>
             <a:r>
               <a:rPr lang="en-US" dirty="0" smtClean="0"/>
-              <a:t>Location-based Map redirection via Google Map and/or Map App</a:t>
-            </a:r>
-          </a:p>
-          <a:p>
-            <a:pPr lvl="1"/>
+              <a:t>Location-based Map redirection via Google Map and/or Map </a:t>
+            </a:r>
+            <a:r>
+              <a:rPr lang="en-US" dirty="0" smtClean="0"/>
+              <a:t>App</a:t>
+            </a:r>
             <a:r>
               <a:rPr lang="en-US" dirty="0"/>
               <a:t/>
@@ -9075,7 +9251,7 @@
           <a:p>
             <a:r>
               <a:rPr lang="en-US" dirty="0" smtClean="0"/>
-              <a:t>The Process</a:t>
+              <a:t>Key Points</a:t>
             </a:r>
             <a:endParaRPr lang="en-US" dirty="0"/>
           </a:p>
@@ -9107,17 +9283,17 @@
               </a:spcBef>
             </a:pPr>
             <a:r>
-              <a:rPr lang="en-US" sz="2200" dirty="0" smtClean="0"/>
-              <a:t>What </a:t>
-            </a:r>
-            <a:r>
-              <a:rPr lang="en-US" sz="2200" dirty="0"/>
-              <a:t>was your process and what did you learn from the process?</a:t>
+              <a:rPr lang="en-US" sz="1700" dirty="0" smtClean="0"/>
+              <a:t>Windows Phone development is streamlined with Visual Studio and the Windows Phone SDK</a:t>
+            </a:r>
+            <a:r>
+              <a:rPr lang="en-US" sz="1700" dirty="0"/>
+              <a:t/>
             </a:r>
             <a:br>
-              <a:rPr lang="en-US" sz="2200" dirty="0"/>
+              <a:rPr lang="en-US" sz="1700" dirty="0"/>
             </a:br>
-            <a:endParaRPr lang="en-US" sz="2200" dirty="0" smtClean="0"/>
+            <a:endParaRPr lang="en-US" sz="1700" dirty="0" smtClean="0"/>
           </a:p>
           <a:p>
             <a:pPr>
@@ -9129,17 +9305,17 @@
               </a:spcBef>
             </a:pPr>
             <a:r>
-              <a:rPr lang="en-US" sz="2200" dirty="0" smtClean="0"/>
-              <a:t>What </a:t>
-            </a:r>
-            <a:r>
-              <a:rPr lang="en-US" sz="2200" dirty="0"/>
-              <a:t>is the consumer Experience?</a:t>
+              <a:rPr lang="en-US" sz="1700" dirty="0" smtClean="0"/>
+              <a:t>The consumer will have an easier portal to obtain information about the institutions on campus.</a:t>
+            </a:r>
+            <a:r>
+              <a:rPr lang="en-US" sz="1700" dirty="0"/>
+              <a:t/>
             </a:r>
             <a:br>
-              <a:rPr lang="en-US" sz="2200" dirty="0"/>
+              <a:rPr lang="en-US" sz="1700" dirty="0"/>
             </a:br>
-            <a:endParaRPr lang="en-US" sz="2200" dirty="0" smtClean="0"/>
+            <a:endParaRPr lang="en-US" sz="1700" dirty="0" smtClean="0"/>
           </a:p>
           <a:p>
             <a:pPr>
@@ -9151,21 +9327,14 @@
               </a:spcBef>
             </a:pPr>
             <a:r>
-              <a:rPr lang="en-US" sz="2200" dirty="0" smtClean="0"/>
-              <a:t>What </a:t>
-            </a:r>
-            <a:r>
-              <a:rPr lang="en-US" sz="2200" dirty="0"/>
-              <a:t>features are you proud of?</a:t>
-            </a:r>
-            <a:r>
-              <a:rPr lang="en-US" sz="2000" dirty="0"/>
-              <a:t/>
-            </a:r>
-            <a:br>
-              <a:rPr lang="en-US" sz="2000" dirty="0"/>
-            </a:br>
-            <a:endParaRPr lang="en-US" sz="2000" dirty="0" smtClean="0"/>
+              <a:rPr lang="en-US" sz="1700" dirty="0" smtClean="0"/>
+              <a:t>The GPS feature is the highlight feature of the appl</a:t>
+            </a:r>
+            <a:r>
+              <a:rPr lang="en-US" sz="1700" dirty="0" smtClean="0"/>
+              <a:t>ication. </a:t>
+            </a:r>
+            <a:endParaRPr lang="en-US" sz="1700" dirty="0" smtClean="0"/>
           </a:p>
         </p:txBody>
       </p:sp>
@@ -9182,7 +9351,7 @@
         <p:spPr/>
         <p:txBody>
           <a:bodyPr>
-            <a:normAutofit fontScale="92500" lnSpcReduction="10000"/>
+            <a:noAutofit/>
           </a:bodyPr>
           <a:lstStyle/>
           <a:p>
@@ -9195,13 +9364,17 @@
               </a:spcBef>
             </a:pPr>
             <a:r>
-              <a:rPr lang="en-US" dirty="0"/>
-              <a:t>Did the development process suggest you scrape the project?</a:t>
+              <a:rPr lang="en-US" sz="1800" dirty="0" smtClean="0"/>
+              <a:t>The product will prove to be useful to students on their smart phones especially as each institution makes their website more mobile friendly.</a:t>
+            </a:r>
+            <a:r>
+              <a:rPr lang="en-US" sz="1800" dirty="0"/>
+              <a:t/>
             </a:r>
             <a:br>
-              <a:rPr lang="en-US" dirty="0"/>
+              <a:rPr lang="en-US" sz="1800" dirty="0"/>
             </a:br>
-            <a:endParaRPr lang="en-US" dirty="0"/>
+            <a:endParaRPr lang="en-US" sz="1800" dirty="0" smtClean="0"/>
           </a:p>
           <a:p>
             <a:pPr>
@@ -9213,13 +9386,17 @@
               </a:spcBef>
             </a:pPr>
             <a:r>
-              <a:rPr lang="en-US" dirty="0"/>
-              <a:t>Or do you recommend that the project move forward?</a:t>
-            </a:r>
-            <a:br>
-              <a:rPr lang="en-US" dirty="0"/>
-            </a:br>
-            <a:endParaRPr lang="en-US" dirty="0"/>
+              <a:rPr lang="en-US" sz="1800" dirty="0" smtClean="0"/>
+              <a:t>This app has potential to take 100% of the market share in the windows app store as an </a:t>
+            </a:r>
+            <a:r>
+              <a:rPr lang="en-US" sz="1800" dirty="0"/>
+              <a:t>A</a:t>
+            </a:r>
+            <a:r>
+              <a:rPr lang="en-US" sz="1800" dirty="0" smtClean="0"/>
+              <a:t>uraria campus app.</a:t>
+            </a:r>
           </a:p>
           <a:p>
             <a:pPr>
@@ -9230,14 +9407,7 @@
                 <a:spcPts val="600"/>
               </a:spcBef>
             </a:pPr>
-            <a:r>
-              <a:rPr lang="en-US" dirty="0"/>
-              <a:t>What are your insights into the product? </a:t>
-            </a:r>
-            <a:br>
-              <a:rPr lang="en-US" dirty="0"/>
-            </a:br>
-            <a:endParaRPr lang="en-US" dirty="0"/>
+            <a:endParaRPr lang="en-US" sz="1800" dirty="0" smtClean="0"/>
           </a:p>
           <a:p>
             <a:pPr>
@@ -9249,14 +9419,14 @@
               </a:spcBef>
             </a:pPr>
             <a:r>
-              <a:rPr lang="en-US" dirty="0"/>
-              <a:t>Does it have potential</a:t>
-            </a:r>
-            <a:r>
-              <a:rPr lang="en-US" dirty="0" smtClean="0"/>
-              <a:t>?</a:t>
-            </a:r>
-            <a:endParaRPr lang="en-US" dirty="0"/>
+              <a:rPr lang="en-US" sz="1800" dirty="0" smtClean="0"/>
+              <a:t>The </a:t>
+            </a:r>
+            <a:r>
+              <a:rPr lang="en-US" sz="1800" dirty="0"/>
+              <a:t>project has high potential, therefore continued development is recommended.</a:t>
+            </a:r>
+            <a:endParaRPr lang="en-US" sz="1800" dirty="0"/>
           </a:p>
         </p:txBody>
       </p:sp>
@@ -9342,7 +9512,7 @@
             <p:ph idx="1"/>
             <p:extLst>
               <p:ext uri="{D42A27DB-BD31-4B8C-83A1-F6EECF244321}">
-                <p14:modId xmlns:p14="http://schemas.microsoft.com/office/powerpoint/2010/main" val="599732002"/>
+                <p14:modId xmlns:p14="http://schemas.microsoft.com/office/powerpoint/2010/main" val="2833629482"/>
               </p:ext>
             </p:extLst>
           </p:nvPr>
@@ -9423,7 +9593,11 @@
           <a:p>
             <a:r>
               <a:rPr lang="en-US" dirty="0" smtClean="0"/>
-              <a:t>Planning: Business Requirement</a:t>
+              <a:t>Planning: Business </a:t>
+            </a:r>
+            <a:r>
+              <a:rPr lang="en-US" dirty="0" smtClean="0"/>
+              <a:t>Requirements</a:t>
             </a:r>
             <a:endParaRPr lang="en-US" dirty="0"/>
           </a:p>
@@ -9467,8 +9641,20 @@
             <a:pPr lvl="1"/>
             <a:r>
               <a:rPr lang="en-US" dirty="0" smtClean="0"/>
-              <a:t>To be able to use smartphone’s GPS for direction.</a:t>
-            </a:r>
+              <a:t>To be able to use smartphone’s GPS for direction</a:t>
+            </a:r>
+            <a:r>
+              <a:rPr lang="en-US" dirty="0" smtClean="0"/>
+              <a:t>.</a:t>
+            </a:r>
+          </a:p>
+          <a:p>
+            <a:pPr lvl="1"/>
+            <a:r>
+              <a:rPr lang="en-US" dirty="0" smtClean="0"/>
+              <a:t>To allow the student to download the official campus map.</a:t>
+            </a:r>
+            <a:endParaRPr lang="en-US" dirty="0" smtClean="0"/>
           </a:p>
           <a:p>
             <a:endParaRPr lang="en-US" dirty="0"/>
@@ -9563,13 +9749,37 @@
           <a:p>
             <a:r>
               <a:rPr lang="en-US" dirty="0" smtClean="0"/>
-              <a:t>User can self-navigate through the app</a:t>
-            </a:r>
-          </a:p>
-          <a:p>
+              <a:t>User can </a:t>
+            </a:r>
             <a:r>
               <a:rPr lang="en-US" dirty="0" smtClean="0"/>
-              <a:t>Important information of the campus provided on a native app</a:t>
+              <a:t>easily navigate </a:t>
+            </a:r>
+            <a:r>
+              <a:rPr lang="en-US" dirty="0" smtClean="0"/>
+              <a:t>through the app</a:t>
+            </a:r>
+          </a:p>
+          <a:p>
+            <a:r>
+              <a:rPr lang="en-US" dirty="0" smtClean="0"/>
+              <a:t>Important information of the campus </a:t>
+            </a:r>
+            <a:r>
+              <a:rPr lang="en-US" dirty="0" smtClean="0"/>
+              <a:t>is provided </a:t>
+            </a:r>
+            <a:r>
+              <a:rPr lang="en-US" dirty="0" smtClean="0"/>
+              <a:t>on </a:t>
+            </a:r>
+            <a:r>
+              <a:rPr lang="en-US" dirty="0" smtClean="0"/>
+              <a:t>the </a:t>
+            </a:r>
+            <a:r>
+              <a:rPr lang="en-US" dirty="0" smtClean="0"/>
+              <a:t>native app</a:t>
             </a:r>
           </a:p>
           <a:p>
@@ -9675,7 +9885,52 @@
           <a:p>
             <a:r>
               <a:rPr lang="en-US" dirty="0" smtClean="0"/>
-              <a:t>Demo the prototype</a:t>
+              <a:t>Demo the </a:t>
+            </a:r>
+            <a:r>
+              <a:rPr lang="en-US" dirty="0" smtClean="0"/>
+              <a:t>prototype</a:t>
+            </a:r>
+          </a:p>
+          <a:p>
+            <a:r>
+              <a:rPr lang="en-US" dirty="0" smtClean="0"/>
+              <a:t>Available on Windows Phone App Store (Free)</a:t>
+            </a:r>
+          </a:p>
+          <a:p>
+            <a:pPr lvl="1"/>
+            <a:r>
+              <a:rPr lang="en-US" dirty="0" smtClean="0"/>
+              <a:t>You will find the app under these keywords:</a:t>
+            </a:r>
+          </a:p>
+          <a:p>
+            <a:pPr lvl="2"/>
+            <a:r>
+              <a:rPr lang="en-US" dirty="0" smtClean="0"/>
+              <a:t>Auraria Campus</a:t>
+            </a:r>
+          </a:p>
+          <a:p>
+            <a:pPr lvl="2"/>
+            <a:r>
+              <a:rPr lang="en-US" dirty="0" smtClean="0"/>
+              <a:t>MSUD</a:t>
+            </a:r>
+          </a:p>
+          <a:p>
+            <a:pPr lvl="2"/>
+            <a:r>
+              <a:rPr lang="en-US" dirty="0" smtClean="0"/>
+              <a:t>UCD</a:t>
+            </a:r>
+          </a:p>
+          <a:p>
+            <a:pPr lvl="2"/>
+            <a:r>
+              <a:rPr lang="en-US" dirty="0" smtClean="0"/>
+              <a:t>CCD</a:t>
             </a:r>
             <a:endParaRPr lang="en-US" dirty="0"/>
           </a:p>

</xml_diff>